<commit_message>
Fix bug when cropping images that are already cropped
</commit_message>
<xml_diff>
--- a/doc/test/CropToSame.pptx
+++ b/doc/test/CropToSame.pptx
@@ -7,7 +7,7 @@
     <p:sldMasterId id="2147483672" r:id="rId3"/>
   </p:sldMasterIdLst>
   <p:notesMasterIdLst>
-    <p:notesMasterId r:id="rId32"/>
+    <p:notesMasterId r:id="rId35"/>
   </p:notesMasterIdLst>
   <p:sldIdLst>
     <p:sldId id="287" r:id="rId4"/>
@@ -33,11 +33,14 @@
     <p:sldId id="325" r:id="rId24"/>
     <p:sldId id="355" r:id="rId25"/>
     <p:sldId id="357" r:id="rId26"/>
-    <p:sldId id="331" r:id="rId27"/>
-    <p:sldId id="332" r:id="rId28"/>
-    <p:sldId id="333" r:id="rId29"/>
-    <p:sldId id="334" r:id="rId30"/>
-    <p:sldId id="318" r:id="rId31"/>
+    <p:sldId id="366" r:id="rId27"/>
+    <p:sldId id="365" r:id="rId28"/>
+    <p:sldId id="368" r:id="rId29"/>
+    <p:sldId id="331" r:id="rId30"/>
+    <p:sldId id="332" r:id="rId31"/>
+    <p:sldId id="333" r:id="rId32"/>
+    <p:sldId id="334" r:id="rId33"/>
+    <p:sldId id="318" r:id="rId34"/>
   </p:sldIdLst>
   <p:sldSz cx="9144000" cy="6858000" type="screen4x3"/>
   <p:notesSz cx="6858000" cy="9144000"/>
@@ -168,6 +171,9 @@
             <p14:sldId id="325"/>
             <p14:sldId id="355"/>
             <p14:sldId id="357"/>
+            <p14:sldId id="366"/>
+            <p14:sldId id="365"/>
+            <p14:sldId id="368"/>
             <p14:sldId id="331"/>
             <p14:sldId id="332"/>
             <p14:sldId id="333"/>
@@ -277,7 +283,7 @@
           <a:p>
             <a:fld id="{26004F41-C1A1-4B0D-9EEE-5E3F0E5BC108}" type="datetimeFigureOut">
               <a:rPr lang="en-SG" smtClean="0"/>
-              <a:t>2/4/2017</a:t>
+              <a:t>3/12/2017</a:t>
             </a:fld>
             <a:endParaRPr lang="en-SG"/>
           </a:p>
@@ -726,7 +732,7 @@
           <a:p>
             <a:fld id="{699DC775-C286-4358-8C92-D7E584E969B3}" type="datetimeFigureOut">
               <a:rPr lang="en-US" smtClean="0"/>
-              <a:t>2/4/2017</a:t>
+              <a:t>3/12/2017</a:t>
             </a:fld>
             <a:endParaRPr lang="en-US"/>
           </a:p>
@@ -896,7 +902,7 @@
           <a:p>
             <a:fld id="{699DC775-C286-4358-8C92-D7E584E969B3}" type="datetimeFigureOut">
               <a:rPr lang="en-US" smtClean="0"/>
-              <a:t>2/4/2017</a:t>
+              <a:t>3/12/2017</a:t>
             </a:fld>
             <a:endParaRPr lang="en-US"/>
           </a:p>
@@ -1076,7 +1082,7 @@
           <a:p>
             <a:fld id="{699DC775-C286-4358-8C92-D7E584E969B3}" type="datetimeFigureOut">
               <a:rPr lang="en-US" smtClean="0"/>
-              <a:t>2/4/2017</a:t>
+              <a:t>3/12/2017</a:t>
             </a:fld>
             <a:endParaRPr lang="en-US"/>
           </a:p>
@@ -1318,7 +1324,7 @@
           <a:p>
             <a:fld id="{699DC775-C286-4358-8C92-D7E584E969B3}" type="datetimeFigureOut">
               <a:rPr lang="en-US" smtClean="0"/>
-              <a:t>2/4/2017</a:t>
+              <a:t>3/12/2017</a:t>
             </a:fld>
             <a:endParaRPr lang="en-US"/>
           </a:p>
@@ -1488,7 +1494,7 @@
           <a:p>
             <a:fld id="{699DC775-C286-4358-8C92-D7E584E969B3}" type="datetimeFigureOut">
               <a:rPr lang="en-US" smtClean="0"/>
-              <a:t>2/4/2017</a:t>
+              <a:t>3/12/2017</a:t>
             </a:fld>
             <a:endParaRPr lang="en-US"/>
           </a:p>
@@ -1734,7 +1740,7 @@
           <a:p>
             <a:fld id="{699DC775-C286-4358-8C92-D7E584E969B3}" type="datetimeFigureOut">
               <a:rPr lang="en-US" smtClean="0"/>
-              <a:t>2/4/2017</a:t>
+              <a:t>3/12/2017</a:t>
             </a:fld>
             <a:endParaRPr lang="en-US"/>
           </a:p>
@@ -2022,7 +2028,7 @@
           <a:p>
             <a:fld id="{699DC775-C286-4358-8C92-D7E584E969B3}" type="datetimeFigureOut">
               <a:rPr lang="en-US" smtClean="0"/>
-              <a:t>2/4/2017</a:t>
+              <a:t>3/12/2017</a:t>
             </a:fld>
             <a:endParaRPr lang="en-US"/>
           </a:p>
@@ -2444,7 +2450,7 @@
           <a:p>
             <a:fld id="{699DC775-C286-4358-8C92-D7E584E969B3}" type="datetimeFigureOut">
               <a:rPr lang="en-US" smtClean="0"/>
-              <a:t>2/4/2017</a:t>
+              <a:t>3/12/2017</a:t>
             </a:fld>
             <a:endParaRPr lang="en-US"/>
           </a:p>
@@ -2562,7 +2568,7 @@
           <a:p>
             <a:fld id="{699DC775-C286-4358-8C92-D7E584E969B3}" type="datetimeFigureOut">
               <a:rPr lang="en-US" smtClean="0"/>
-              <a:t>2/4/2017</a:t>
+              <a:t>3/12/2017</a:t>
             </a:fld>
             <a:endParaRPr lang="en-US"/>
           </a:p>
@@ -2657,7 +2663,7 @@
           <a:p>
             <a:fld id="{699DC775-C286-4358-8C92-D7E584E969B3}" type="datetimeFigureOut">
               <a:rPr lang="en-US" smtClean="0"/>
-              <a:t>2/4/2017</a:t>
+              <a:t>3/12/2017</a:t>
             </a:fld>
             <a:endParaRPr lang="en-US"/>
           </a:p>
@@ -2934,7 +2940,7 @@
           <a:p>
             <a:fld id="{699DC775-C286-4358-8C92-D7E584E969B3}" type="datetimeFigureOut">
               <a:rPr lang="en-US" smtClean="0"/>
-              <a:t>2/4/2017</a:t>
+              <a:t>3/12/2017</a:t>
             </a:fld>
             <a:endParaRPr lang="en-US"/>
           </a:p>
@@ -3104,7 +3110,7 @@
           <a:p>
             <a:fld id="{699DC775-C286-4358-8C92-D7E584E969B3}" type="datetimeFigureOut">
               <a:rPr lang="en-US" smtClean="0"/>
-              <a:t>2/4/2017</a:t>
+              <a:t>3/12/2017</a:t>
             </a:fld>
             <a:endParaRPr lang="en-US"/>
           </a:p>
@@ -3357,7 +3363,7 @@
           <a:p>
             <a:fld id="{699DC775-C286-4358-8C92-D7E584E969B3}" type="datetimeFigureOut">
               <a:rPr lang="en-US" smtClean="0"/>
-              <a:t>2/4/2017</a:t>
+              <a:t>3/12/2017</a:t>
             </a:fld>
             <a:endParaRPr lang="en-US"/>
           </a:p>
@@ -3527,7 +3533,7 @@
           <a:p>
             <a:fld id="{699DC775-C286-4358-8C92-D7E584E969B3}" type="datetimeFigureOut">
               <a:rPr lang="en-US" smtClean="0"/>
-              <a:t>2/4/2017</a:t>
+              <a:t>3/12/2017</a:t>
             </a:fld>
             <a:endParaRPr lang="en-US"/>
           </a:p>
@@ -3707,7 +3713,7 @@
           <a:p>
             <a:fld id="{699DC775-C286-4358-8C92-D7E584E969B3}" type="datetimeFigureOut">
               <a:rPr lang="en-US" smtClean="0"/>
-              <a:t>2/4/2017</a:t>
+              <a:t>3/12/2017</a:t>
             </a:fld>
             <a:endParaRPr lang="en-US"/>
           </a:p>
@@ -3957,7 +3963,7 @@
           <a:p>
             <a:fld id="{699DC775-C286-4358-8C92-D7E584E969B3}" type="datetimeFigureOut">
               <a:rPr lang="en-US" smtClean="0"/>
-              <a:t>2/4/2017</a:t>
+              <a:t>3/12/2017</a:t>
             </a:fld>
             <a:endParaRPr lang="en-US"/>
           </a:p>
@@ -4135,7 +4141,7 @@
           <a:p>
             <a:fld id="{699DC775-C286-4358-8C92-D7E584E969B3}" type="datetimeFigureOut">
               <a:rPr lang="en-US" smtClean="0"/>
-              <a:t>2/4/2017</a:t>
+              <a:t>3/12/2017</a:t>
             </a:fld>
             <a:endParaRPr lang="en-US"/>
           </a:p>
@@ -4389,7 +4395,7 @@
           <a:p>
             <a:fld id="{699DC775-C286-4358-8C92-D7E584E969B3}" type="datetimeFigureOut">
               <a:rPr lang="en-US" smtClean="0"/>
-              <a:t>2/4/2017</a:t>
+              <a:t>3/12/2017</a:t>
             </a:fld>
             <a:endParaRPr lang="en-US"/>
           </a:p>
@@ -4685,7 +4691,7 @@
           <a:p>
             <a:fld id="{699DC775-C286-4358-8C92-D7E584E969B3}" type="datetimeFigureOut">
               <a:rPr lang="en-US" smtClean="0"/>
-              <a:t>2/4/2017</a:t>
+              <a:t>3/12/2017</a:t>
             </a:fld>
             <a:endParaRPr lang="en-US"/>
           </a:p>
@@ -5115,7 +5121,7 @@
           <a:p>
             <a:fld id="{699DC775-C286-4358-8C92-D7E584E969B3}" type="datetimeFigureOut">
               <a:rPr lang="en-US" smtClean="0"/>
-              <a:t>2/4/2017</a:t>
+              <a:t>3/12/2017</a:t>
             </a:fld>
             <a:endParaRPr lang="en-US"/>
           </a:p>
@@ -5241,7 +5247,7 @@
           <a:p>
             <a:fld id="{699DC775-C286-4358-8C92-D7E584E969B3}" type="datetimeFigureOut">
               <a:rPr lang="en-US" smtClean="0"/>
-              <a:t>2/4/2017</a:t>
+              <a:t>3/12/2017</a:t>
             </a:fld>
             <a:endParaRPr lang="en-US"/>
           </a:p>
@@ -5344,7 +5350,7 @@
           <a:p>
             <a:fld id="{699DC775-C286-4358-8C92-D7E584E969B3}" type="datetimeFigureOut">
               <a:rPr lang="en-US" smtClean="0"/>
-              <a:t>2/4/2017</a:t>
+              <a:t>3/12/2017</a:t>
             </a:fld>
             <a:endParaRPr lang="en-US"/>
           </a:p>
@@ -5590,7 +5596,7 @@
           <a:p>
             <a:fld id="{699DC775-C286-4358-8C92-D7E584E969B3}" type="datetimeFigureOut">
               <a:rPr lang="en-US" smtClean="0"/>
-              <a:t>2/4/2017</a:t>
+              <a:t>3/12/2017</a:t>
             </a:fld>
             <a:endParaRPr lang="en-US"/>
           </a:p>
@@ -5875,7 +5881,7 @@
           <a:p>
             <a:fld id="{699DC775-C286-4358-8C92-D7E584E969B3}" type="datetimeFigureOut">
               <a:rPr lang="en-US" smtClean="0"/>
-              <a:t>2/4/2017</a:t>
+              <a:t>3/12/2017</a:t>
             </a:fld>
             <a:endParaRPr lang="en-US"/>
           </a:p>
@@ -6136,7 +6142,7 @@
           <a:p>
             <a:fld id="{699DC775-C286-4358-8C92-D7E584E969B3}" type="datetimeFigureOut">
               <a:rPr lang="en-US" smtClean="0"/>
-              <a:t>2/4/2017</a:t>
+              <a:t>3/12/2017</a:t>
             </a:fld>
             <a:endParaRPr lang="en-US"/>
           </a:p>
@@ -6314,7 +6320,7 @@
           <a:p>
             <a:fld id="{699DC775-C286-4358-8C92-D7E584E969B3}" type="datetimeFigureOut">
               <a:rPr lang="en-US" smtClean="0"/>
-              <a:t>2/4/2017</a:t>
+              <a:t>3/12/2017</a:t>
             </a:fld>
             <a:endParaRPr lang="en-US"/>
           </a:p>
@@ -6502,7 +6508,7 @@
           <a:p>
             <a:fld id="{699DC775-C286-4358-8C92-D7E584E969B3}" type="datetimeFigureOut">
               <a:rPr lang="en-US" smtClean="0"/>
-              <a:t>2/4/2017</a:t>
+              <a:t>3/12/2017</a:t>
             </a:fld>
             <a:endParaRPr lang="en-US"/>
           </a:p>
@@ -6790,7 +6796,7 @@
           <a:p>
             <a:fld id="{699DC775-C286-4358-8C92-D7E584E969B3}" type="datetimeFigureOut">
               <a:rPr lang="en-US" smtClean="0"/>
-              <a:t>2/4/2017</a:t>
+              <a:t>3/12/2017</a:t>
             </a:fld>
             <a:endParaRPr lang="en-US"/>
           </a:p>
@@ -7212,7 +7218,7 @@
           <a:p>
             <a:fld id="{699DC775-C286-4358-8C92-D7E584E969B3}" type="datetimeFigureOut">
               <a:rPr lang="en-US" smtClean="0"/>
-              <a:t>2/4/2017</a:t>
+              <a:t>3/12/2017</a:t>
             </a:fld>
             <a:endParaRPr lang="en-US"/>
           </a:p>
@@ -7330,7 +7336,7 @@
           <a:p>
             <a:fld id="{699DC775-C286-4358-8C92-D7E584E969B3}" type="datetimeFigureOut">
               <a:rPr lang="en-US" smtClean="0"/>
-              <a:t>2/4/2017</a:t>
+              <a:t>3/12/2017</a:t>
             </a:fld>
             <a:endParaRPr lang="en-US"/>
           </a:p>
@@ -7425,7 +7431,7 @@
           <a:p>
             <a:fld id="{699DC775-C286-4358-8C92-D7E584E969B3}" type="datetimeFigureOut">
               <a:rPr lang="en-US" smtClean="0"/>
-              <a:t>2/4/2017</a:t>
+              <a:t>3/12/2017</a:t>
             </a:fld>
             <a:endParaRPr lang="en-US"/>
           </a:p>
@@ -7702,7 +7708,7 @@
           <a:p>
             <a:fld id="{699DC775-C286-4358-8C92-D7E584E969B3}" type="datetimeFigureOut">
               <a:rPr lang="en-US" smtClean="0"/>
-              <a:t>2/4/2017</a:t>
+              <a:t>3/12/2017</a:t>
             </a:fld>
             <a:endParaRPr lang="en-US"/>
           </a:p>
@@ -7955,7 +7961,7 @@
           <a:p>
             <a:fld id="{699DC775-C286-4358-8C92-D7E584E969B3}" type="datetimeFigureOut">
               <a:rPr lang="en-US" smtClean="0"/>
-              <a:t>2/4/2017</a:t>
+              <a:t>3/12/2017</a:t>
             </a:fld>
             <a:endParaRPr lang="en-US"/>
           </a:p>
@@ -8168,7 +8174,7 @@
           <a:p>
             <a:fld id="{699DC775-C286-4358-8C92-D7E584E969B3}" type="datetimeFigureOut">
               <a:rPr lang="en-US" smtClean="0"/>
-              <a:t>2/4/2017</a:t>
+              <a:t>3/12/2017</a:t>
             </a:fld>
             <a:endParaRPr lang="en-US"/>
           </a:p>
@@ -8683,7 +8689,7 @@
           <a:p>
             <a:fld id="{699DC775-C286-4358-8C92-D7E584E969B3}" type="datetimeFigureOut">
               <a:rPr lang="en-US" smtClean="0"/>
-              <a:t>2/4/2017</a:t>
+              <a:t>3/12/2017</a:t>
             </a:fld>
             <a:endParaRPr lang="en-US"/>
           </a:p>
@@ -9196,7 +9202,7 @@
           <a:p>
             <a:fld id="{699DC775-C286-4358-8C92-D7E584E969B3}" type="datetimeFigureOut">
               <a:rPr lang="en-US" smtClean="0"/>
-              <a:t>2/4/2017</a:t>
+              <a:t>3/12/2017</a:t>
             </a:fld>
             <a:endParaRPr lang="en-US"/>
           </a:p>
@@ -11381,6 +11387,303 @@
           <a:p>
             <a:r>
               <a:rPr lang="en-US" dirty="0" smtClean="0"/>
+              <a:t>Auto Crop:: Cropped image</a:t>
+            </a:r>
+            <a:br>
+              <a:rPr lang="en-US" dirty="0" smtClean="0"/>
+            </a:br>
+            <a:endParaRPr lang="en-SG" dirty="0"/>
+          </a:p>
+        </p:txBody>
+      </p:sp>
+      <p:sp>
+        <p:nvSpPr>
+          <p:cNvPr id="3" name="Content Placeholder 2"/>
+          <p:cNvSpPr>
+            <a:spLocks noGrp="1"/>
+          </p:cNvSpPr>
+          <p:nvPr>
+            <p:ph idx="1"/>
+          </p:nvPr>
+        </p:nvSpPr>
+        <p:spPr/>
+        <p:txBody>
+          <a:bodyPr/>
+          <a:lstStyle/>
+          <a:p>
+            <a:endParaRPr lang="en-SG" dirty="0"/>
+          </a:p>
+        </p:txBody>
+      </p:sp>
+    </p:spTree>
+    <p:extLst>
+      <p:ext uri="{BB962C8B-B14F-4D97-AF65-F5344CB8AC3E}">
+        <p14:creationId xmlns:p14="http://schemas.microsoft.com/office/powerpoint/2010/main" val="731725823"/>
+      </p:ext>
+    </p:extLst>
+  </p:cSld>
+  <p:clrMapOvr>
+    <a:masterClrMapping/>
+  </p:clrMapOvr>
+</p:sld>
+</file>
+
+<file path=ppt/slides/slide25.xml><?xml version="1.0" encoding="utf-8"?>
+<p:sld xmlns:a="http://schemas.openxmlformats.org/drawingml/2006/main" xmlns:r="http://schemas.openxmlformats.org/officeDocument/2006/relationships" xmlns:p="http://schemas.openxmlformats.org/presentationml/2006/main">
+  <p:cSld>
+    <p:bg>
+      <p:bgPr>
+        <a:solidFill>
+          <a:schemeClr val="bg1"/>
+        </a:solidFill>
+        <a:effectLst/>
+      </p:bgPr>
+    </p:bg>
+    <p:spTree>
+      <p:nvGrpSpPr>
+        <p:cNvPr id="1" name=""/>
+        <p:cNvGrpSpPr/>
+        <p:nvPr/>
+      </p:nvGrpSpPr>
+      <p:grpSpPr>
+        <a:xfrm>
+          <a:off x="0" y="0"/>
+          <a:ext cx="0" cy="0"/>
+          <a:chOff x="0" y="0"/>
+          <a:chExt cx="0" cy="0"/>
+        </a:xfrm>
+      </p:grpSpPr>
+      <p:pic>
+        <p:nvPicPr>
+          <p:cNvPr id="4" name="selectMe2"/>
+          <p:cNvPicPr>
+            <a:picLocks noChangeAspect="1"/>
+          </p:cNvPicPr>
+          <p:nvPr/>
+        </p:nvPicPr>
+        <p:blipFill rotWithShape="1">
+          <a:blip r:embed="rId2">
+            <a:extLst>
+              <a:ext uri="{28A0092B-C50C-407E-A947-70E740481C1C}">
+                <a14:useLocalDpi xmlns:a14="http://schemas.microsoft.com/office/drawing/2010/main" val="0"/>
+              </a:ext>
+            </a:extLst>
+          </a:blip>
+          <a:srcRect l="30001" t="32390" r="33331" b="30237"/>
+          <a:stretch/>
+        </p:blipFill>
+        <p:spPr>
+          <a:xfrm>
+            <a:off x="1828800" y="1219200"/>
+            <a:ext cx="1676400" cy="1143000"/>
+          </a:xfrm>
+          <a:prstGeom prst="rect">
+            <a:avLst/>
+          </a:prstGeom>
+        </p:spPr>
+      </p:pic>
+      <p:pic>
+        <p:nvPicPr>
+          <p:cNvPr id="3" name="selectMe1"/>
+          <p:cNvPicPr>
+            <a:picLocks noChangeAspect="1"/>
+          </p:cNvPicPr>
+          <p:nvPr/>
+        </p:nvPicPr>
+        <p:blipFill rotWithShape="1">
+          <a:blip r:embed="rId2">
+            <a:extLst>
+              <a:ext uri="{28A0092B-C50C-407E-A947-70E740481C1C}">
+                <a14:useLocalDpi xmlns:a14="http://schemas.microsoft.com/office/drawing/2010/main" val="0"/>
+              </a:ext>
+            </a:extLst>
+          </a:blip>
+          <a:srcRect l="10000" t="9966" r="6667" b="10306"/>
+          <a:stretch/>
+        </p:blipFill>
+        <p:spPr>
+          <a:xfrm>
+            <a:off x="4800600" y="3810000"/>
+            <a:ext cx="3810000" cy="2438400"/>
+          </a:xfrm>
+          <a:prstGeom prst="rect">
+            <a:avLst/>
+          </a:prstGeom>
+        </p:spPr>
+      </p:pic>
+    </p:spTree>
+    <p:extLst>
+      <p:ext uri="{BB962C8B-B14F-4D97-AF65-F5344CB8AC3E}">
+        <p14:creationId xmlns:p14="http://schemas.microsoft.com/office/powerpoint/2010/main" val="132719599"/>
+      </p:ext>
+    </p:extLst>
+  </p:cSld>
+  <p:clrMapOvr>
+    <a:masterClrMapping/>
+  </p:clrMapOvr>
+</p:sld>
+</file>
+
+<file path=ppt/slides/slide26.xml><?xml version="1.0" encoding="utf-8"?>
+<p:sld xmlns:a="http://schemas.openxmlformats.org/drawingml/2006/main" xmlns:r="http://schemas.openxmlformats.org/officeDocument/2006/relationships" xmlns:p="http://schemas.openxmlformats.org/presentationml/2006/main">
+  <p:cSld>
+    <p:bg>
+      <p:bgPr>
+        <a:solidFill>
+          <a:schemeClr val="bg1"/>
+        </a:solidFill>
+        <a:effectLst/>
+      </p:bgPr>
+    </p:bg>
+    <p:spTree>
+      <p:nvGrpSpPr>
+        <p:cNvPr id="1" name=""/>
+        <p:cNvGrpSpPr/>
+        <p:nvPr/>
+      </p:nvGrpSpPr>
+      <p:grpSpPr>
+        <a:xfrm>
+          <a:off x="0" y="0"/>
+          <a:ext cx="0" cy="0"/>
+          <a:chOff x="0" y="0"/>
+          <a:chExt cx="0" cy="0"/>
+        </a:xfrm>
+      </p:grpSpPr>
+      <p:pic>
+        <p:nvPicPr>
+          <p:cNvPr id="4" name="selectMe2"/>
+          <p:cNvPicPr>
+            <a:picLocks noChangeAspect="1"/>
+          </p:cNvPicPr>
+          <p:nvPr/>
+        </p:nvPicPr>
+        <p:blipFill rotWithShape="1">
+          <a:blip r:embed="rId2">
+            <a:extLst>
+              <a:ext uri="{28A0092B-C50C-407E-A947-70E740481C1C}">
+                <a14:useLocalDpi xmlns:a14="http://schemas.microsoft.com/office/drawing/2010/main" val="0"/>
+              </a:ext>
+            </a:extLst>
+          </a:blip>
+          <a:srcRect l="30001" t="32390" r="33331" b="30237"/>
+          <a:stretch/>
+        </p:blipFill>
+        <p:spPr>
+          <a:xfrm>
+            <a:off x="1828800" y="1219200"/>
+            <a:ext cx="1676400" cy="1143000"/>
+          </a:xfrm>
+          <a:prstGeom prst="rect">
+            <a:avLst/>
+          </a:prstGeom>
+        </p:spPr>
+      </p:pic>
+      <p:pic>
+        <p:nvPicPr>
+          <p:cNvPr id="3" name="selectMe1"/>
+          <p:cNvPicPr>
+            <a:picLocks noChangeAspect="1"/>
+          </p:cNvPicPr>
+          <p:nvPr/>
+        </p:nvPicPr>
+        <p:blipFill rotWithShape="1">
+          <a:blip r:embed="rId2">
+            <a:extLst>
+              <a:ext uri="{28A0092B-C50C-407E-A947-70E740481C1C}">
+                <a14:useLocalDpi xmlns:a14="http://schemas.microsoft.com/office/drawing/2010/main" val="0"/>
+              </a:ext>
+            </a:extLst>
+          </a:blip>
+          <a:srcRect l="32106" t="31872" r="31227" b="30756"/>
+          <a:stretch/>
+        </p:blipFill>
+        <p:spPr>
+          <a:xfrm>
+            <a:off x="5811307" y="4479966"/>
+            <a:ext cx="1676408" cy="1142999"/>
+          </a:xfrm>
+          <a:prstGeom prst="rect">
+            <a:avLst/>
+          </a:prstGeom>
+        </p:spPr>
+      </p:pic>
+      <p:sp>
+        <p:nvSpPr>
+          <p:cNvPr id="5" name="text"/>
+          <p:cNvSpPr txBox="1"/>
+          <p:nvPr/>
+        </p:nvSpPr>
+        <p:spPr>
+          <a:xfrm>
+            <a:off x="8101022" y="0"/>
+            <a:ext cx="1042978" cy="369332"/>
+          </a:xfrm>
+          <a:prstGeom prst="rect">
+            <a:avLst/>
+          </a:prstGeom>
+          <a:noFill/>
+        </p:spPr>
+        <p:txBody>
+          <a:bodyPr wrap="none" rtlCol="0">
+            <a:spAutoFit/>
+          </a:bodyPr>
+          <a:lstStyle/>
+          <a:p>
+            <a:r>
+              <a:rPr lang="en-SG" dirty="0" smtClean="0"/>
+              <a:t>Expected</a:t>
+            </a:r>
+            <a:endParaRPr lang="en-SG" dirty="0"/>
+          </a:p>
+        </p:txBody>
+      </p:sp>
+    </p:spTree>
+    <p:extLst>
+      <p:ext uri="{BB962C8B-B14F-4D97-AF65-F5344CB8AC3E}">
+        <p14:creationId xmlns:p14="http://schemas.microsoft.com/office/powerpoint/2010/main" val="3134480863"/>
+      </p:ext>
+    </p:extLst>
+  </p:cSld>
+  <p:clrMapOvr>
+    <a:masterClrMapping/>
+  </p:clrMapOvr>
+</p:sld>
+</file>
+
+<file path=ppt/slides/slide27.xml><?xml version="1.0" encoding="utf-8"?>
+<p:sld xmlns:a="http://schemas.openxmlformats.org/drawingml/2006/main" xmlns:r="http://schemas.openxmlformats.org/officeDocument/2006/relationships" xmlns:p="http://schemas.openxmlformats.org/presentationml/2006/main">
+  <p:cSld>
+    <p:spTree>
+      <p:nvGrpSpPr>
+        <p:cNvPr id="1" name=""/>
+        <p:cNvGrpSpPr/>
+        <p:nvPr/>
+      </p:nvGrpSpPr>
+      <p:grpSpPr>
+        <a:xfrm>
+          <a:off x="0" y="0"/>
+          <a:ext cx="0" cy="0"/>
+          <a:chOff x="0" y="0"/>
+          <a:chExt cx="0" cy="0"/>
+        </a:xfrm>
+      </p:grpSpPr>
+      <p:sp>
+        <p:nvSpPr>
+          <p:cNvPr id="2" name="Title 1"/>
+          <p:cNvSpPr>
+            <a:spLocks noGrp="1"/>
+          </p:cNvSpPr>
+          <p:nvPr>
+            <p:ph type="title"/>
+          </p:nvPr>
+        </p:nvSpPr>
+        <p:spPr/>
+        <p:txBody>
+          <a:bodyPr/>
+          <a:lstStyle/>
+          <a:p>
+            <a:r>
+              <a:rPr lang="en-US" dirty="0" smtClean="0"/>
               <a:t>Auto Crop:: non-picture selected</a:t>
             </a:r>
             <a:endParaRPr lang="en-SG" dirty="0"/>
@@ -11423,7 +11726,7 @@
 </p:sld>
 </file>
 
-<file path=ppt/slides/slide25.xml><?xml version="1.0" encoding="utf-8"?>
+<file path=ppt/slides/slide28.xml><?xml version="1.0" encoding="utf-8"?>
 <p:sld xmlns:a="http://schemas.openxmlformats.org/drawingml/2006/main" xmlns:r="http://schemas.openxmlformats.org/officeDocument/2006/relationships" xmlns:p="http://schemas.openxmlformats.org/presentationml/2006/main">
   <p:cSld>
     <p:spTree>
@@ -11533,7 +11836,7 @@
 </p:sld>
 </file>
 
-<file path=ppt/slides/slide26.xml><?xml version="1.0" encoding="utf-8"?>
+<file path=ppt/slides/slide29.xml><?xml version="1.0" encoding="utf-8"?>
 <p:sld xmlns:a="http://schemas.openxmlformats.org/drawingml/2006/main" xmlns:r="http://schemas.openxmlformats.org/officeDocument/2006/relationships" xmlns:p="http://schemas.openxmlformats.org/presentationml/2006/main">
   <p:cSld>
     <p:spTree>
@@ -11611,7 +11914,79 @@
 </p:sld>
 </file>
 
-<file path=ppt/slides/slide27.xml><?xml version="1.0" encoding="utf-8"?>
+<file path=ppt/slides/slide3.xml><?xml version="1.0" encoding="utf-8"?>
+<p:sld xmlns:a="http://schemas.openxmlformats.org/drawingml/2006/main" xmlns:r="http://schemas.openxmlformats.org/officeDocument/2006/relationships" xmlns:p="http://schemas.openxmlformats.org/presentationml/2006/main">
+  <p:cSld>
+    <p:spTree>
+      <p:nvGrpSpPr>
+        <p:cNvPr id="1" name=""/>
+        <p:cNvGrpSpPr/>
+        <p:nvPr/>
+      </p:nvGrpSpPr>
+      <p:grpSpPr>
+        <a:xfrm>
+          <a:off x="0" y="0"/>
+          <a:ext cx="0" cy="0"/>
+          <a:chOff x="0" y="0"/>
+          <a:chExt cx="0" cy="0"/>
+        </a:xfrm>
+      </p:grpSpPr>
+      <p:sp>
+        <p:nvSpPr>
+          <p:cNvPr id="2" name="Title 1"/>
+          <p:cNvSpPr>
+            <a:spLocks noGrp="1"/>
+          </p:cNvSpPr>
+          <p:nvPr>
+            <p:ph type="title"/>
+          </p:nvPr>
+        </p:nvSpPr>
+        <p:spPr/>
+        <p:txBody>
+          <a:bodyPr/>
+          <a:lstStyle/>
+          <a:p>
+            <a:r>
+              <a:rPr lang="en-US" dirty="0" smtClean="0"/>
+              <a:t>Auto Crop:: Same picture</a:t>
+            </a:r>
+            <a:endParaRPr lang="en-SG" dirty="0"/>
+          </a:p>
+        </p:txBody>
+      </p:sp>
+      <p:sp>
+        <p:nvSpPr>
+          <p:cNvPr id="3" name="Content Placeholder 2"/>
+          <p:cNvSpPr>
+            <a:spLocks noGrp="1"/>
+          </p:cNvSpPr>
+          <p:nvPr>
+            <p:ph idx="1"/>
+          </p:nvPr>
+        </p:nvSpPr>
+        <p:spPr/>
+        <p:txBody>
+          <a:bodyPr/>
+          <a:lstStyle/>
+          <a:p>
+            <a:endParaRPr lang="en-SG" dirty="0"/>
+          </a:p>
+        </p:txBody>
+      </p:sp>
+    </p:spTree>
+    <p:extLst>
+      <p:ext uri="{BB962C8B-B14F-4D97-AF65-F5344CB8AC3E}">
+        <p14:creationId xmlns:p14="http://schemas.microsoft.com/office/powerpoint/2010/main" val="1286891872"/>
+      </p:ext>
+    </p:extLst>
+  </p:cSld>
+  <p:clrMapOvr>
+    <a:masterClrMapping/>
+  </p:clrMapOvr>
+</p:sld>
+</file>
+
+<file path=ppt/slides/slide30.xml><?xml version="1.0" encoding="utf-8"?>
 <p:sld xmlns:a="http://schemas.openxmlformats.org/drawingml/2006/main" xmlns:r="http://schemas.openxmlformats.org/officeDocument/2006/relationships" xmlns:p="http://schemas.openxmlformats.org/presentationml/2006/main">
   <p:cSld>
     <p:spTree>
@@ -11641,7 +12016,7 @@
 </p:sld>
 </file>
 
-<file path=ppt/slides/slide28.xml><?xml version="1.0" encoding="utf-8"?>
+<file path=ppt/slides/slide31.xml><?xml version="1.0" encoding="utf-8"?>
 <p:sld xmlns:a="http://schemas.openxmlformats.org/drawingml/2006/main" xmlns:r="http://schemas.openxmlformats.org/officeDocument/2006/relationships" xmlns:p="http://schemas.openxmlformats.org/presentationml/2006/main" show="0">
   <p:cSld>
     <p:spTree>
@@ -11731,78 +12106,6 @@
       </p:par>
     </p:tnLst>
   </p:timing>
-</p:sld>
-</file>
-
-<file path=ppt/slides/slide3.xml><?xml version="1.0" encoding="utf-8"?>
-<p:sld xmlns:a="http://schemas.openxmlformats.org/drawingml/2006/main" xmlns:r="http://schemas.openxmlformats.org/officeDocument/2006/relationships" xmlns:p="http://schemas.openxmlformats.org/presentationml/2006/main">
-  <p:cSld>
-    <p:spTree>
-      <p:nvGrpSpPr>
-        <p:cNvPr id="1" name=""/>
-        <p:cNvGrpSpPr/>
-        <p:nvPr/>
-      </p:nvGrpSpPr>
-      <p:grpSpPr>
-        <a:xfrm>
-          <a:off x="0" y="0"/>
-          <a:ext cx="0" cy="0"/>
-          <a:chOff x="0" y="0"/>
-          <a:chExt cx="0" cy="0"/>
-        </a:xfrm>
-      </p:grpSpPr>
-      <p:sp>
-        <p:nvSpPr>
-          <p:cNvPr id="2" name="Title 1"/>
-          <p:cNvSpPr>
-            <a:spLocks noGrp="1"/>
-          </p:cNvSpPr>
-          <p:nvPr>
-            <p:ph type="title"/>
-          </p:nvPr>
-        </p:nvSpPr>
-        <p:spPr/>
-        <p:txBody>
-          <a:bodyPr/>
-          <a:lstStyle/>
-          <a:p>
-            <a:r>
-              <a:rPr lang="en-US" dirty="0" smtClean="0"/>
-              <a:t>Auto Crop:: Same picture</a:t>
-            </a:r>
-            <a:endParaRPr lang="en-SG" dirty="0"/>
-          </a:p>
-        </p:txBody>
-      </p:sp>
-      <p:sp>
-        <p:nvSpPr>
-          <p:cNvPr id="3" name="Content Placeholder 2"/>
-          <p:cNvSpPr>
-            <a:spLocks noGrp="1"/>
-          </p:cNvSpPr>
-          <p:nvPr>
-            <p:ph idx="1"/>
-          </p:nvPr>
-        </p:nvSpPr>
-        <p:spPr/>
-        <p:txBody>
-          <a:bodyPr/>
-          <a:lstStyle/>
-          <a:p>
-            <a:endParaRPr lang="en-SG" dirty="0"/>
-          </a:p>
-        </p:txBody>
-      </p:sp>
-    </p:spTree>
-    <p:extLst>
-      <p:ext uri="{BB962C8B-B14F-4D97-AF65-F5344CB8AC3E}">
-        <p14:creationId xmlns:p14="http://schemas.microsoft.com/office/powerpoint/2010/main" val="1286891872"/>
-      </p:ext>
-    </p:extLst>
-  </p:cSld>
-  <p:clrMapOvr>
-    <a:masterClrMapping/>
-  </p:clrMapOvr>
 </p:sld>
 </file>
 

</xml_diff>

<commit_message>
Add test for anchor
</commit_message>
<xml_diff>
--- a/doc/test/CropToSame.pptx
+++ b/doc/test/CropToSame.pptx
@@ -7,7 +7,7 @@
     <p:sldMasterId id="2147483672" r:id="rId3"/>
   </p:sldMasterIdLst>
   <p:notesMasterIdLst>
-    <p:notesMasterId r:id="rId33"/>
+    <p:notesMasterId r:id="rId36"/>
   </p:notesMasterIdLst>
   <p:sldIdLst>
     <p:sldId id="287" r:id="rId4"/>
@@ -30,15 +30,18 @@
     <p:sldId id="366" r:id="rId21"/>
     <p:sldId id="365" r:id="rId22"/>
     <p:sldId id="368" r:id="rId23"/>
-    <p:sldId id="331" r:id="rId24"/>
-    <p:sldId id="332" r:id="rId25"/>
-    <p:sldId id="333" r:id="rId26"/>
-    <p:sldId id="334" r:id="rId27"/>
-    <p:sldId id="292" r:id="rId28"/>
-    <p:sldId id="293" r:id="rId29"/>
-    <p:sldId id="321" r:id="rId30"/>
-    <p:sldId id="362" r:id="rId31"/>
-    <p:sldId id="318" r:id="rId32"/>
+    <p:sldId id="369" r:id="rId24"/>
+    <p:sldId id="371" r:id="rId25"/>
+    <p:sldId id="372" r:id="rId26"/>
+    <p:sldId id="331" r:id="rId27"/>
+    <p:sldId id="332" r:id="rId28"/>
+    <p:sldId id="333" r:id="rId29"/>
+    <p:sldId id="334" r:id="rId30"/>
+    <p:sldId id="292" r:id="rId31"/>
+    <p:sldId id="293" r:id="rId32"/>
+    <p:sldId id="321" r:id="rId33"/>
+    <p:sldId id="362" r:id="rId34"/>
+    <p:sldId id="318" r:id="rId35"/>
   </p:sldIdLst>
   <p:sldSz cx="9144000" cy="6858000" type="screen4x3"/>
   <p:notesSz cx="6858000" cy="9144000"/>
@@ -166,6 +169,9 @@
             <p14:sldId id="366"/>
             <p14:sldId id="365"/>
             <p14:sldId id="368"/>
+            <p14:sldId id="369"/>
+            <p14:sldId id="371"/>
+            <p14:sldId id="372"/>
             <p14:sldId id="331"/>
             <p14:sldId id="332"/>
             <p14:sldId id="333"/>
@@ -279,7 +285,7 @@
           <a:p>
             <a:fld id="{26004F41-C1A1-4B0D-9EEE-5E3F0E5BC108}" type="datetimeFigureOut">
               <a:rPr lang="en-SG" smtClean="0"/>
-              <a:t>3/20/2017</a:t>
+              <a:t>3/31/2017</a:t>
             </a:fld>
             <a:endParaRPr lang="en-SG"/>
           </a:p>
@@ -726,7 +732,7 @@
           <a:p>
             <a:fld id="{699DC775-C286-4358-8C92-D7E584E969B3}" type="datetimeFigureOut">
               <a:rPr lang="en-US" smtClean="0"/>
-              <a:t>3/20/2017</a:t>
+              <a:t>3/31/2017</a:t>
             </a:fld>
             <a:endParaRPr lang="en-US"/>
           </a:p>
@@ -894,7 +900,7 @@
           <a:p>
             <a:fld id="{699DC775-C286-4358-8C92-D7E584E969B3}" type="datetimeFigureOut">
               <a:rPr lang="en-US" smtClean="0"/>
-              <a:t>3/20/2017</a:t>
+              <a:t>3/31/2017</a:t>
             </a:fld>
             <a:endParaRPr lang="en-US"/>
           </a:p>
@@ -1072,7 +1078,7 @@
           <a:p>
             <a:fld id="{699DC775-C286-4358-8C92-D7E584E969B3}" type="datetimeFigureOut">
               <a:rPr lang="en-US" smtClean="0"/>
-              <a:t>3/20/2017</a:t>
+              <a:t>3/31/2017</a:t>
             </a:fld>
             <a:endParaRPr lang="en-US"/>
           </a:p>
@@ -1312,7 +1318,7 @@
           <a:p>
             <a:fld id="{699DC775-C286-4358-8C92-D7E584E969B3}" type="datetimeFigureOut">
               <a:rPr lang="en-US" smtClean="0"/>
-              <a:t>3/20/2017</a:t>
+              <a:t>3/31/2017</a:t>
             </a:fld>
             <a:endParaRPr lang="en-US"/>
           </a:p>
@@ -1480,7 +1486,7 @@
           <a:p>
             <a:fld id="{699DC775-C286-4358-8C92-D7E584E969B3}" type="datetimeFigureOut">
               <a:rPr lang="en-US" smtClean="0"/>
-              <a:t>3/20/2017</a:t>
+              <a:t>3/31/2017</a:t>
             </a:fld>
             <a:endParaRPr lang="en-US"/>
           </a:p>
@@ -1725,7 +1731,7 @@
           <a:p>
             <a:fld id="{699DC775-C286-4358-8C92-D7E584E969B3}" type="datetimeFigureOut">
               <a:rPr lang="en-US" smtClean="0"/>
-              <a:t>3/20/2017</a:t>
+              <a:t>3/31/2017</a:t>
             </a:fld>
             <a:endParaRPr lang="en-US"/>
           </a:p>
@@ -2010,7 +2016,7 @@
           <a:p>
             <a:fld id="{699DC775-C286-4358-8C92-D7E584E969B3}" type="datetimeFigureOut">
               <a:rPr lang="en-US" smtClean="0"/>
-              <a:t>3/20/2017</a:t>
+              <a:t>3/31/2017</a:t>
             </a:fld>
             <a:endParaRPr lang="en-US"/>
           </a:p>
@@ -2429,7 +2435,7 @@
           <a:p>
             <a:fld id="{699DC775-C286-4358-8C92-D7E584E969B3}" type="datetimeFigureOut">
               <a:rPr lang="en-US" smtClean="0"/>
-              <a:t>3/20/2017</a:t>
+              <a:t>3/31/2017</a:t>
             </a:fld>
             <a:endParaRPr lang="en-US"/>
           </a:p>
@@ -2546,7 +2552,7 @@
           <a:p>
             <a:fld id="{699DC775-C286-4358-8C92-D7E584E969B3}" type="datetimeFigureOut">
               <a:rPr lang="en-US" smtClean="0"/>
-              <a:t>3/20/2017</a:t>
+              <a:t>3/31/2017</a:t>
             </a:fld>
             <a:endParaRPr lang="en-US"/>
           </a:p>
@@ -2641,7 +2647,7 @@
           <a:p>
             <a:fld id="{699DC775-C286-4358-8C92-D7E584E969B3}" type="datetimeFigureOut">
               <a:rPr lang="en-US" smtClean="0"/>
-              <a:t>3/20/2017</a:t>
+              <a:t>3/31/2017</a:t>
             </a:fld>
             <a:endParaRPr lang="en-US"/>
           </a:p>
@@ -2916,7 +2922,7 @@
           <a:p>
             <a:fld id="{699DC775-C286-4358-8C92-D7E584E969B3}" type="datetimeFigureOut">
               <a:rPr lang="en-US" smtClean="0"/>
-              <a:t>3/20/2017</a:t>
+              <a:t>3/31/2017</a:t>
             </a:fld>
             <a:endParaRPr lang="en-US"/>
           </a:p>
@@ -3084,7 +3090,7 @@
           <a:p>
             <a:fld id="{699DC775-C286-4358-8C92-D7E584E969B3}" type="datetimeFigureOut">
               <a:rPr lang="en-US" smtClean="0"/>
-              <a:t>3/20/2017</a:t>
+              <a:t>3/31/2017</a:t>
             </a:fld>
             <a:endParaRPr lang="en-US"/>
           </a:p>
@@ -3336,7 +3342,7 @@
           <a:p>
             <a:fld id="{699DC775-C286-4358-8C92-D7E584E969B3}" type="datetimeFigureOut">
               <a:rPr lang="en-US" smtClean="0"/>
-              <a:t>3/20/2017</a:t>
+              <a:t>3/31/2017</a:t>
             </a:fld>
             <a:endParaRPr lang="en-US"/>
           </a:p>
@@ -3504,7 +3510,7 @@
           <a:p>
             <a:fld id="{699DC775-C286-4358-8C92-D7E584E969B3}" type="datetimeFigureOut">
               <a:rPr lang="en-US" smtClean="0"/>
-              <a:t>3/20/2017</a:t>
+              <a:t>3/31/2017</a:t>
             </a:fld>
             <a:endParaRPr lang="en-US"/>
           </a:p>
@@ -3682,7 +3688,7 @@
           <a:p>
             <a:fld id="{699DC775-C286-4358-8C92-D7E584E969B3}" type="datetimeFigureOut">
               <a:rPr lang="en-US" smtClean="0"/>
-              <a:t>3/20/2017</a:t>
+              <a:t>3/31/2017</a:t>
             </a:fld>
             <a:endParaRPr lang="en-US"/>
           </a:p>
@@ -3930,7 +3936,7 @@
           <a:p>
             <a:fld id="{699DC775-C286-4358-8C92-D7E584E969B3}" type="datetimeFigureOut">
               <a:rPr lang="en-US" smtClean="0"/>
-              <a:t>3/20/2017</a:t>
+              <a:t>3/31/2017</a:t>
             </a:fld>
             <a:endParaRPr lang="en-US"/>
           </a:p>
@@ -4106,7 +4112,7 @@
           <a:p>
             <a:fld id="{699DC775-C286-4358-8C92-D7E584E969B3}" type="datetimeFigureOut">
               <a:rPr lang="en-US" smtClean="0"/>
-              <a:t>3/20/2017</a:t>
+              <a:t>3/31/2017</a:t>
             </a:fld>
             <a:endParaRPr lang="en-US"/>
           </a:p>
@@ -4359,7 +4365,7 @@
           <a:p>
             <a:fld id="{699DC775-C286-4358-8C92-D7E584E969B3}" type="datetimeFigureOut">
               <a:rPr lang="en-US" smtClean="0"/>
-              <a:t>3/20/2017</a:t>
+              <a:t>3/31/2017</a:t>
             </a:fld>
             <a:endParaRPr lang="en-US"/>
           </a:p>
@@ -4652,7 +4658,7 @@
           <a:p>
             <a:fld id="{699DC775-C286-4358-8C92-D7E584E969B3}" type="datetimeFigureOut">
               <a:rPr lang="en-US" smtClean="0"/>
-              <a:t>3/20/2017</a:t>
+              <a:t>3/31/2017</a:t>
             </a:fld>
             <a:endParaRPr lang="en-US"/>
           </a:p>
@@ -5079,7 +5085,7 @@
           <a:p>
             <a:fld id="{699DC775-C286-4358-8C92-D7E584E969B3}" type="datetimeFigureOut">
               <a:rPr lang="en-US" smtClean="0"/>
-              <a:t>3/20/2017</a:t>
+              <a:t>3/31/2017</a:t>
             </a:fld>
             <a:endParaRPr lang="en-US"/>
           </a:p>
@@ -5204,7 +5210,7 @@
           <a:p>
             <a:fld id="{699DC775-C286-4358-8C92-D7E584E969B3}" type="datetimeFigureOut">
               <a:rPr lang="en-US" smtClean="0"/>
-              <a:t>3/20/2017</a:t>
+              <a:t>3/31/2017</a:t>
             </a:fld>
             <a:endParaRPr lang="en-US"/>
           </a:p>
@@ -5307,7 +5313,7 @@
           <a:p>
             <a:fld id="{699DC775-C286-4358-8C92-D7E584E969B3}" type="datetimeFigureOut">
               <a:rPr lang="en-US" smtClean="0"/>
-              <a:t>3/20/2017</a:t>
+              <a:t>3/31/2017</a:t>
             </a:fld>
             <a:endParaRPr lang="en-US"/>
           </a:p>
@@ -5552,7 +5558,7 @@
           <a:p>
             <a:fld id="{699DC775-C286-4358-8C92-D7E584E969B3}" type="datetimeFigureOut">
               <a:rPr lang="en-US" smtClean="0"/>
-              <a:t>3/20/2017</a:t>
+              <a:t>3/31/2017</a:t>
             </a:fld>
             <a:endParaRPr lang="en-US"/>
           </a:p>
@@ -5835,7 +5841,7 @@
           <a:p>
             <a:fld id="{699DC775-C286-4358-8C92-D7E584E969B3}" type="datetimeFigureOut">
               <a:rPr lang="en-US" smtClean="0"/>
-              <a:t>3/20/2017</a:t>
+              <a:t>3/31/2017</a:t>
             </a:fld>
             <a:endParaRPr lang="en-US"/>
           </a:p>
@@ -6095,7 +6101,7 @@
           <a:p>
             <a:fld id="{699DC775-C286-4358-8C92-D7E584E969B3}" type="datetimeFigureOut">
               <a:rPr lang="en-US" smtClean="0"/>
-              <a:t>3/20/2017</a:t>
+              <a:t>3/31/2017</a:t>
             </a:fld>
             <a:endParaRPr lang="en-US"/>
           </a:p>
@@ -6271,7 +6277,7 @@
           <a:p>
             <a:fld id="{699DC775-C286-4358-8C92-D7E584E969B3}" type="datetimeFigureOut">
               <a:rPr lang="en-US" smtClean="0"/>
-              <a:t>3/20/2017</a:t>
+              <a:t>3/31/2017</a:t>
             </a:fld>
             <a:endParaRPr lang="en-US"/>
           </a:p>
@@ -6457,7 +6463,7 @@
           <a:p>
             <a:fld id="{699DC775-C286-4358-8C92-D7E584E969B3}" type="datetimeFigureOut">
               <a:rPr lang="en-US" smtClean="0"/>
-              <a:t>3/20/2017</a:t>
+              <a:t>3/31/2017</a:t>
             </a:fld>
             <a:endParaRPr lang="en-US"/>
           </a:p>
@@ -6742,7 +6748,7 @@
           <a:p>
             <a:fld id="{699DC775-C286-4358-8C92-D7E584E969B3}" type="datetimeFigureOut">
               <a:rPr lang="en-US" smtClean="0"/>
-              <a:t>3/20/2017</a:t>
+              <a:t>3/31/2017</a:t>
             </a:fld>
             <a:endParaRPr lang="en-US"/>
           </a:p>
@@ -7161,7 +7167,7 @@
           <a:p>
             <a:fld id="{699DC775-C286-4358-8C92-D7E584E969B3}" type="datetimeFigureOut">
               <a:rPr lang="en-US" smtClean="0"/>
-              <a:t>3/20/2017</a:t>
+              <a:t>3/31/2017</a:t>
             </a:fld>
             <a:endParaRPr lang="en-US"/>
           </a:p>
@@ -7278,7 +7284,7 @@
           <a:p>
             <a:fld id="{699DC775-C286-4358-8C92-D7E584E969B3}" type="datetimeFigureOut">
               <a:rPr lang="en-US" smtClean="0"/>
-              <a:t>3/20/2017</a:t>
+              <a:t>3/31/2017</a:t>
             </a:fld>
             <a:endParaRPr lang="en-US"/>
           </a:p>
@@ -7373,7 +7379,7 @@
           <a:p>
             <a:fld id="{699DC775-C286-4358-8C92-D7E584E969B3}" type="datetimeFigureOut">
               <a:rPr lang="en-US" smtClean="0"/>
-              <a:t>3/20/2017</a:t>
+              <a:t>3/31/2017</a:t>
             </a:fld>
             <a:endParaRPr lang="en-US"/>
           </a:p>
@@ -7648,7 +7654,7 @@
           <a:p>
             <a:fld id="{699DC775-C286-4358-8C92-D7E584E969B3}" type="datetimeFigureOut">
               <a:rPr lang="en-US" smtClean="0"/>
-              <a:t>3/20/2017</a:t>
+              <a:t>3/31/2017</a:t>
             </a:fld>
             <a:endParaRPr lang="en-US"/>
           </a:p>
@@ -7900,7 +7906,7 @@
           <a:p>
             <a:fld id="{699DC775-C286-4358-8C92-D7E584E969B3}" type="datetimeFigureOut">
               <a:rPr lang="en-US" smtClean="0"/>
-              <a:t>3/20/2017</a:t>
+              <a:t>3/31/2017</a:t>
             </a:fld>
             <a:endParaRPr lang="en-US"/>
           </a:p>
@@ -8111,7 +8117,7 @@
           <a:p>
             <a:fld id="{699DC775-C286-4358-8C92-D7E584E969B3}" type="datetimeFigureOut">
               <a:rPr lang="en-US" smtClean="0"/>
-              <a:t>3/20/2017</a:t>
+              <a:t>3/31/2017</a:t>
             </a:fld>
             <a:endParaRPr lang="en-US"/>
           </a:p>
@@ -8624,7 +8630,7 @@
           <a:p>
             <a:fld id="{699DC775-C286-4358-8C92-D7E584E969B3}" type="datetimeFigureOut">
               <a:rPr lang="en-US" smtClean="0"/>
-              <a:t>3/20/2017</a:t>
+              <a:t>3/31/2017</a:t>
             </a:fld>
             <a:endParaRPr lang="en-US"/>
           </a:p>
@@ -9135,7 +9141,7 @@
           <a:p>
             <a:fld id="{699DC775-C286-4358-8C92-D7E584E969B3}" type="datetimeFigureOut">
               <a:rPr lang="en-US" smtClean="0"/>
-              <a:t>3/20/2017</a:t>
+              <a:t>3/31/2017</a:t>
             </a:fld>
             <a:endParaRPr lang="en-US"/>
           </a:p>
@@ -10957,6 +10963,304 @@
           <a:p>
             <a:r>
               <a:rPr lang="en-US" dirty="0"/>
+              <a:t>Auto Crop:: Custom Anchor</a:t>
+            </a:r>
+            <a:endParaRPr lang="en-SG" dirty="0"/>
+          </a:p>
+        </p:txBody>
+      </p:sp>
+      <p:sp>
+        <p:nvSpPr>
+          <p:cNvPr id="3" name="Content Placeholder 2"/>
+          <p:cNvSpPr>
+            <a:spLocks noGrp="1"/>
+          </p:cNvSpPr>
+          <p:nvPr>
+            <p:ph idx="1"/>
+          </p:nvPr>
+        </p:nvSpPr>
+        <p:spPr/>
+        <p:txBody>
+          <a:bodyPr/>
+          <a:lstStyle/>
+          <a:p>
+            <a:endParaRPr lang="en-SG" dirty="0"/>
+          </a:p>
+        </p:txBody>
+      </p:sp>
+    </p:spTree>
+    <p:extLst>
+      <p:ext uri="{BB962C8B-B14F-4D97-AF65-F5344CB8AC3E}">
+        <p14:creationId xmlns:p14="http://schemas.microsoft.com/office/powerpoint/2010/main" val="2505799667"/>
+      </p:ext>
+    </p:extLst>
+  </p:cSld>
+  <p:clrMapOvr>
+    <a:masterClrMapping/>
+  </p:clrMapOvr>
+</p:sld>
+</file>
+
+<file path=ppt/slides/slide22.xml><?xml version="1.0" encoding="utf-8"?>
+<p:sld xmlns:a="http://schemas.openxmlformats.org/drawingml/2006/main" xmlns:r="http://schemas.openxmlformats.org/officeDocument/2006/relationships" xmlns:p="http://schemas.openxmlformats.org/presentationml/2006/main">
+  <p:cSld>
+    <p:bg>
+      <p:bgPr>
+        <a:solidFill>
+          <a:schemeClr val="bg1"/>
+        </a:solidFill>
+        <a:effectLst/>
+      </p:bgPr>
+    </p:bg>
+    <p:spTree>
+      <p:nvGrpSpPr>
+        <p:cNvPr id="1" name=""/>
+        <p:cNvGrpSpPr/>
+        <p:nvPr/>
+      </p:nvGrpSpPr>
+      <p:grpSpPr>
+        <a:xfrm>
+          <a:off x="0" y="0"/>
+          <a:ext cx="0" cy="0"/>
+          <a:chOff x="0" y="0"/>
+          <a:chExt cx="0" cy="0"/>
+        </a:xfrm>
+      </p:grpSpPr>
+      <p:pic>
+        <p:nvPicPr>
+          <p:cNvPr id="5" name="selectMe2"/>
+          <p:cNvPicPr>
+            <a:picLocks noChangeAspect="1"/>
+          </p:cNvPicPr>
+          <p:nvPr/>
+        </p:nvPicPr>
+        <p:blipFill>
+          <a:blip r:embed="rId2" cstate="print">
+            <a:extLst>
+              <a:ext uri="{28A0092B-C50C-407E-A947-70E740481C1C}">
+                <a14:useLocalDpi xmlns:a14="http://schemas.microsoft.com/office/drawing/2010/main" val="0"/>
+              </a:ext>
+            </a:extLst>
+          </a:blip>
+          <a:stretch>
+            <a:fillRect/>
+          </a:stretch>
+        </p:blipFill>
+        <p:spPr>
+          <a:xfrm>
+            <a:off x="381000" y="1095152"/>
+            <a:ext cx="3276600" cy="2191866"/>
+          </a:xfrm>
+          <a:prstGeom prst="rect">
+            <a:avLst/>
+          </a:prstGeom>
+        </p:spPr>
+      </p:pic>
+      <p:pic>
+        <p:nvPicPr>
+          <p:cNvPr id="3" name="selectMe1"/>
+          <p:cNvPicPr>
+            <a:picLocks noChangeAspect="1"/>
+          </p:cNvPicPr>
+          <p:nvPr/>
+        </p:nvPicPr>
+        <p:blipFill>
+          <a:blip r:embed="rId3">
+            <a:extLst>
+              <a:ext uri="{28A0092B-C50C-407E-A947-70E740481C1C}">
+                <a14:useLocalDpi xmlns:a14="http://schemas.microsoft.com/office/drawing/2010/main" val="0"/>
+              </a:ext>
+            </a:extLst>
+          </a:blip>
+          <a:stretch>
+            <a:fillRect/>
+          </a:stretch>
+        </p:blipFill>
+        <p:spPr>
+          <a:xfrm>
+            <a:off x="4343400" y="3505200"/>
+            <a:ext cx="4572000" cy="3058418"/>
+          </a:xfrm>
+          <a:prstGeom prst="rect">
+            <a:avLst/>
+          </a:prstGeom>
+        </p:spPr>
+      </p:pic>
+    </p:spTree>
+    <p:extLst>
+      <p:ext uri="{BB962C8B-B14F-4D97-AF65-F5344CB8AC3E}">
+        <p14:creationId xmlns:p14="http://schemas.microsoft.com/office/powerpoint/2010/main" val="4278097101"/>
+      </p:ext>
+    </p:extLst>
+  </p:cSld>
+  <p:clrMapOvr>
+    <a:masterClrMapping/>
+  </p:clrMapOvr>
+</p:sld>
+</file>
+
+<file path=ppt/slides/slide23.xml><?xml version="1.0" encoding="utf-8"?>
+<p:sld xmlns:a="http://schemas.openxmlformats.org/drawingml/2006/main" xmlns:r="http://schemas.openxmlformats.org/officeDocument/2006/relationships" xmlns:p="http://schemas.openxmlformats.org/presentationml/2006/main">
+  <p:cSld>
+    <p:bg>
+      <p:bgPr>
+        <a:solidFill>
+          <a:schemeClr val="bg1"/>
+        </a:solidFill>
+        <a:effectLst/>
+      </p:bgPr>
+    </p:bg>
+    <p:spTree>
+      <p:nvGrpSpPr>
+        <p:cNvPr id="1" name=""/>
+        <p:cNvGrpSpPr/>
+        <p:nvPr/>
+      </p:nvGrpSpPr>
+      <p:grpSpPr>
+        <a:xfrm>
+          <a:off x="0" y="0"/>
+          <a:ext cx="0" cy="0"/>
+          <a:chOff x="0" y="0"/>
+          <a:chExt cx="0" cy="0"/>
+        </a:xfrm>
+      </p:grpSpPr>
+      <p:pic>
+        <p:nvPicPr>
+          <p:cNvPr id="5" name="selectMe2"/>
+          <p:cNvPicPr>
+            <a:picLocks noChangeAspect="1"/>
+          </p:cNvPicPr>
+          <p:nvPr/>
+        </p:nvPicPr>
+        <p:blipFill>
+          <a:blip r:embed="rId2" cstate="print">
+            <a:extLst>
+              <a:ext uri="{28A0092B-C50C-407E-A947-70E740481C1C}">
+                <a14:useLocalDpi xmlns:a14="http://schemas.microsoft.com/office/drawing/2010/main" val="0"/>
+              </a:ext>
+            </a:extLst>
+          </a:blip>
+          <a:stretch>
+            <a:fillRect/>
+          </a:stretch>
+        </p:blipFill>
+        <p:spPr>
+          <a:xfrm>
+            <a:off x="381000" y="1095152"/>
+            <a:ext cx="3276600" cy="2191866"/>
+          </a:xfrm>
+          <a:prstGeom prst="rect">
+            <a:avLst/>
+          </a:prstGeom>
+        </p:spPr>
+      </p:pic>
+      <p:pic>
+        <p:nvPicPr>
+          <p:cNvPr id="3" name="selectMe1"/>
+          <p:cNvPicPr>
+            <a:picLocks noChangeAspect="1"/>
+          </p:cNvPicPr>
+          <p:nvPr/>
+        </p:nvPicPr>
+        <p:blipFill>
+          <a:blip r:embed="rId3">
+            <a:extLst>
+              <a:ext uri="{28A0092B-C50C-407E-A947-70E740481C1C}">
+                <a14:useLocalDpi xmlns:a14="http://schemas.microsoft.com/office/drawing/2010/main" val="0"/>
+              </a:ext>
+            </a:extLst>
+          </a:blip>
+          <a:srcRect l="28333" t="28333"/>
+          <a:stretch>
+            <a:fillRect/>
+          </a:stretch>
+        </p:blipFill>
+        <p:spPr>
+          <a:xfrm>
+            <a:off x="5638799" y="4371751"/>
+            <a:ext cx="3276601" cy="2191867"/>
+          </a:xfrm>
+          <a:prstGeom prst="rect">
+            <a:avLst/>
+          </a:prstGeom>
+        </p:spPr>
+      </p:pic>
+      <p:sp>
+        <p:nvSpPr>
+          <p:cNvPr id="4" name="text"/>
+          <p:cNvSpPr txBox="1"/>
+          <p:nvPr/>
+        </p:nvSpPr>
+        <p:spPr>
+          <a:xfrm>
+            <a:off x="8101022" y="0"/>
+            <a:ext cx="1042978" cy="369332"/>
+          </a:xfrm>
+          <a:prstGeom prst="rect">
+            <a:avLst/>
+          </a:prstGeom>
+          <a:noFill/>
+        </p:spPr>
+        <p:txBody>
+          <a:bodyPr wrap="none" rtlCol="0">
+            <a:spAutoFit/>
+          </a:bodyPr>
+          <a:lstStyle/>
+          <a:p>
+            <a:r>
+              <a:rPr lang="en-SG" dirty="0"/>
+              <a:t>Expected</a:t>
+            </a:r>
+          </a:p>
+        </p:txBody>
+      </p:sp>
+    </p:spTree>
+    <p:extLst>
+      <p:ext uri="{BB962C8B-B14F-4D97-AF65-F5344CB8AC3E}">
+        <p14:creationId xmlns:p14="http://schemas.microsoft.com/office/powerpoint/2010/main" val="4191781960"/>
+      </p:ext>
+    </p:extLst>
+  </p:cSld>
+  <p:clrMapOvr>
+    <a:masterClrMapping/>
+  </p:clrMapOvr>
+</p:sld>
+</file>
+
+<file path=ppt/slides/slide24.xml><?xml version="1.0" encoding="utf-8"?>
+<p:sld xmlns:a="http://schemas.openxmlformats.org/drawingml/2006/main" xmlns:r="http://schemas.openxmlformats.org/officeDocument/2006/relationships" xmlns:p="http://schemas.openxmlformats.org/presentationml/2006/main">
+  <p:cSld>
+    <p:spTree>
+      <p:nvGrpSpPr>
+        <p:cNvPr id="1" name=""/>
+        <p:cNvGrpSpPr/>
+        <p:nvPr/>
+      </p:nvGrpSpPr>
+      <p:grpSpPr>
+        <a:xfrm>
+          <a:off x="0" y="0"/>
+          <a:ext cx="0" cy="0"/>
+          <a:chOff x="0" y="0"/>
+          <a:chExt cx="0" cy="0"/>
+        </a:xfrm>
+      </p:grpSpPr>
+      <p:sp>
+        <p:nvSpPr>
+          <p:cNvPr id="2" name="Title 1"/>
+          <p:cNvSpPr>
+            <a:spLocks noGrp="1"/>
+          </p:cNvSpPr>
+          <p:nvPr>
+            <p:ph type="title"/>
+          </p:nvPr>
+        </p:nvSpPr>
+        <p:spPr/>
+        <p:txBody>
+          <a:bodyPr/>
+          <a:lstStyle/>
+          <a:p>
+            <a:r>
+              <a:rPr lang="en-US" dirty="0"/>
               <a:t>Auto Crop:: non-picture selected</a:t>
             </a:r>
             <a:endParaRPr lang="en-SG" dirty="0"/>
@@ -10998,7 +11302,7 @@
 </p:sld>
 </file>
 
-<file path=ppt/slides/slide22.xml><?xml version="1.0" encoding="utf-8"?>
+<file path=ppt/slides/slide25.xml><?xml version="1.0" encoding="utf-8"?>
 <p:sld xmlns:a="http://schemas.openxmlformats.org/drawingml/2006/main" xmlns:r="http://schemas.openxmlformats.org/officeDocument/2006/relationships" xmlns:p="http://schemas.openxmlformats.org/presentationml/2006/main">
   <p:cSld>
     <p:spTree>
@@ -11108,7 +11412,7 @@
 </p:sld>
 </file>
 
-<file path=ppt/slides/slide23.xml><?xml version="1.0" encoding="utf-8"?>
+<file path=ppt/slides/slide26.xml><?xml version="1.0" encoding="utf-8"?>
 <p:sld xmlns:a="http://schemas.openxmlformats.org/drawingml/2006/main" xmlns:r="http://schemas.openxmlformats.org/officeDocument/2006/relationships" xmlns:p="http://schemas.openxmlformats.org/presentationml/2006/main">
   <p:cSld>
     <p:spTree>
@@ -11186,7 +11490,7 @@
 </p:sld>
 </file>
 
-<file path=ppt/slides/slide24.xml><?xml version="1.0" encoding="utf-8"?>
+<file path=ppt/slides/slide27.xml><?xml version="1.0" encoding="utf-8"?>
 <p:sld xmlns:a="http://schemas.openxmlformats.org/drawingml/2006/main" xmlns:r="http://schemas.openxmlformats.org/officeDocument/2006/relationships" xmlns:p="http://schemas.openxmlformats.org/presentationml/2006/main">
   <p:cSld>
     <p:spTree>
@@ -11216,7 +11520,7 @@
 </p:sld>
 </file>
 
-<file path=ppt/slides/slide25.xml><?xml version="1.0" encoding="utf-8"?>
+<file path=ppt/slides/slide28.xml><?xml version="1.0" encoding="utf-8"?>
 <p:sld xmlns:a="http://schemas.openxmlformats.org/drawingml/2006/main" xmlns:r="http://schemas.openxmlformats.org/officeDocument/2006/relationships" xmlns:p="http://schemas.openxmlformats.org/presentationml/2006/main">
   <p:cSld>
     <p:spTree>
@@ -11288,7 +11592,7 @@
 </p:sld>
 </file>
 
-<file path=ppt/slides/slide26.xml><?xml version="1.0" encoding="utf-8"?>
+<file path=ppt/slides/slide29.xml><?xml version="1.0" encoding="utf-8"?>
 <p:sld xmlns:a="http://schemas.openxmlformats.org/drawingml/2006/main" xmlns:r="http://schemas.openxmlformats.org/officeDocument/2006/relationships" xmlns:p="http://schemas.openxmlformats.org/presentationml/2006/main">
   <p:cSld>
     <p:bg>
@@ -11386,7 +11690,7 @@
 </p:sld>
 </file>
 
-<file path=ppt/slides/slide27.xml><?xml version="1.0" encoding="utf-8"?>
+<file path=ppt/slides/slide3.xml><?xml version="1.0" encoding="utf-8"?>
 <p:sld xmlns:a="http://schemas.openxmlformats.org/drawingml/2006/main" xmlns:r="http://schemas.openxmlformats.org/officeDocument/2006/relationships" xmlns:p="http://schemas.openxmlformats.org/presentationml/2006/main">
   <p:cSld>
     <p:spTree>
@@ -11420,6 +11724,59 @@
           <a:p>
             <a:r>
               <a:rPr lang="en-US" dirty="0"/>
+              <a:t>Auto Crop:: One edge cropped</a:t>
+            </a:r>
+            <a:endParaRPr lang="en-SG" dirty="0"/>
+          </a:p>
+        </p:txBody>
+      </p:sp>
+    </p:spTree>
+    <p:extLst>
+      <p:ext uri="{BB962C8B-B14F-4D97-AF65-F5344CB8AC3E}">
+        <p14:creationId xmlns:p14="http://schemas.microsoft.com/office/powerpoint/2010/main" val="2406691133"/>
+      </p:ext>
+    </p:extLst>
+  </p:cSld>
+  <p:clrMapOvr>
+    <a:masterClrMapping/>
+  </p:clrMapOvr>
+</p:sld>
+</file>
+
+<file path=ppt/slides/slide30.xml><?xml version="1.0" encoding="utf-8"?>
+<p:sld xmlns:a="http://schemas.openxmlformats.org/drawingml/2006/main" xmlns:r="http://schemas.openxmlformats.org/officeDocument/2006/relationships" xmlns:p="http://schemas.openxmlformats.org/presentationml/2006/main">
+  <p:cSld>
+    <p:spTree>
+      <p:nvGrpSpPr>
+        <p:cNvPr id="1" name=""/>
+        <p:cNvGrpSpPr/>
+        <p:nvPr/>
+      </p:nvGrpSpPr>
+      <p:grpSpPr>
+        <a:xfrm>
+          <a:off x="0" y="0"/>
+          <a:ext cx="0" cy="0"/>
+          <a:chOff x="0" y="0"/>
+          <a:chExt cx="0" cy="0"/>
+        </a:xfrm>
+      </p:grpSpPr>
+      <p:sp>
+        <p:nvSpPr>
+          <p:cNvPr id="2" name="Title 1"/>
+          <p:cNvSpPr>
+            <a:spLocks noGrp="1"/>
+          </p:cNvSpPr>
+          <p:nvPr>
+            <p:ph type="title"/>
+          </p:nvPr>
+        </p:nvSpPr>
+        <p:spPr/>
+        <p:txBody>
+          <a:bodyPr/>
+          <a:lstStyle/>
+          <a:p>
+            <a:r>
+              <a:rPr lang="en-US" dirty="0"/>
               <a:t>Auto Crop:: Larger reference image</a:t>
             </a:r>
             <a:endParaRPr lang="en-SG" dirty="0"/>
@@ -11458,7 +11815,7 @@
 </p:sld>
 </file>
 
-<file path=ppt/slides/slide28.xml><?xml version="1.0" encoding="utf-8"?>
+<file path=ppt/slides/slide31.xml><?xml version="1.0" encoding="utf-8"?>
 <p:sld xmlns:a="http://schemas.openxmlformats.org/drawingml/2006/main" xmlns:r="http://schemas.openxmlformats.org/officeDocument/2006/relationships" xmlns:p="http://schemas.openxmlformats.org/presentationml/2006/main">
   <p:cSld>
     <p:bg>
@@ -11556,7 +11913,7 @@
 </p:sld>
 </file>
 
-<file path=ppt/slides/slide29.xml><?xml version="1.0" encoding="utf-8"?>
+<file path=ppt/slides/slide32.xml><?xml version="1.0" encoding="utf-8"?>
 <p:sld xmlns:a="http://schemas.openxmlformats.org/drawingml/2006/main" xmlns:r="http://schemas.openxmlformats.org/officeDocument/2006/relationships" xmlns:p="http://schemas.openxmlformats.org/presentationml/2006/main" show="0">
   <p:cSld>
     <p:spTree>
@@ -11625,59 +11982,6 @@
     <p:extLst>
       <p:ext uri="{BB962C8B-B14F-4D97-AF65-F5344CB8AC3E}">
         <p14:creationId xmlns:p14="http://schemas.microsoft.com/office/powerpoint/2010/main" val="2234878813"/>
-      </p:ext>
-    </p:extLst>
-  </p:cSld>
-  <p:clrMapOvr>
-    <a:masterClrMapping/>
-  </p:clrMapOvr>
-</p:sld>
-</file>
-
-<file path=ppt/slides/slide3.xml><?xml version="1.0" encoding="utf-8"?>
-<p:sld xmlns:a="http://schemas.openxmlformats.org/drawingml/2006/main" xmlns:r="http://schemas.openxmlformats.org/officeDocument/2006/relationships" xmlns:p="http://schemas.openxmlformats.org/presentationml/2006/main">
-  <p:cSld>
-    <p:spTree>
-      <p:nvGrpSpPr>
-        <p:cNvPr id="1" name=""/>
-        <p:cNvGrpSpPr/>
-        <p:nvPr/>
-      </p:nvGrpSpPr>
-      <p:grpSpPr>
-        <a:xfrm>
-          <a:off x="0" y="0"/>
-          <a:ext cx="0" cy="0"/>
-          <a:chOff x="0" y="0"/>
-          <a:chExt cx="0" cy="0"/>
-        </a:xfrm>
-      </p:grpSpPr>
-      <p:sp>
-        <p:nvSpPr>
-          <p:cNvPr id="2" name="Title 1"/>
-          <p:cNvSpPr>
-            <a:spLocks noGrp="1"/>
-          </p:cNvSpPr>
-          <p:nvPr>
-            <p:ph type="title"/>
-          </p:nvPr>
-        </p:nvSpPr>
-        <p:spPr/>
-        <p:txBody>
-          <a:bodyPr/>
-          <a:lstStyle/>
-          <a:p>
-            <a:r>
-              <a:rPr lang="en-US" dirty="0"/>
-              <a:t>Auto Crop:: One edge cropped</a:t>
-            </a:r>
-            <a:endParaRPr lang="en-SG" dirty="0"/>
-          </a:p>
-        </p:txBody>
-      </p:sp>
-    </p:spTree>
-    <p:extLst>
-      <p:ext uri="{BB962C8B-B14F-4D97-AF65-F5344CB8AC3E}">
-        <p14:creationId xmlns:p14="http://schemas.microsoft.com/office/powerpoint/2010/main" val="2406691133"/>
       </p:ext>
     </p:extLst>
   </p:cSld>

</xml_diff>

<commit_message>
Crop to same dimensions: give options for anchor points #1220 (#1265)
* Use anchors for crop to same dim

* CropToSameDim UT

* Add test for anchor

* File didn't delete properly

* Changed radio button name and layout

* Rephrase error messages to make them more end-user friendly #1245 (#1258)

* Correct Error Messages

* Update FTs

* fix text wrap issue (#1280)

* Use anchors for crop to same dim

* CropToSameDim UT

* Add test for anchor

* Changed radio button name and layout
</commit_message>
<xml_diff>
--- a/doc/test/CropToSame.pptx
+++ b/doc/test/CropToSame.pptx
@@ -7,7 +7,7 @@
     <p:sldMasterId id="2147483672" r:id="rId3"/>
   </p:sldMasterIdLst>
   <p:notesMasterIdLst>
-    <p:notesMasterId r:id="rId33"/>
+    <p:notesMasterId r:id="rId36"/>
   </p:notesMasterIdLst>
   <p:sldIdLst>
     <p:sldId id="287" r:id="rId4"/>
@@ -30,15 +30,18 @@
     <p:sldId id="366" r:id="rId21"/>
     <p:sldId id="365" r:id="rId22"/>
     <p:sldId id="368" r:id="rId23"/>
-    <p:sldId id="331" r:id="rId24"/>
-    <p:sldId id="332" r:id="rId25"/>
-    <p:sldId id="333" r:id="rId26"/>
-    <p:sldId id="334" r:id="rId27"/>
-    <p:sldId id="292" r:id="rId28"/>
-    <p:sldId id="293" r:id="rId29"/>
-    <p:sldId id="321" r:id="rId30"/>
-    <p:sldId id="362" r:id="rId31"/>
-    <p:sldId id="318" r:id="rId32"/>
+    <p:sldId id="369" r:id="rId24"/>
+    <p:sldId id="371" r:id="rId25"/>
+    <p:sldId id="372" r:id="rId26"/>
+    <p:sldId id="331" r:id="rId27"/>
+    <p:sldId id="332" r:id="rId28"/>
+    <p:sldId id="333" r:id="rId29"/>
+    <p:sldId id="334" r:id="rId30"/>
+    <p:sldId id="292" r:id="rId31"/>
+    <p:sldId id="293" r:id="rId32"/>
+    <p:sldId id="321" r:id="rId33"/>
+    <p:sldId id="362" r:id="rId34"/>
+    <p:sldId id="318" r:id="rId35"/>
   </p:sldIdLst>
   <p:sldSz cx="9144000" cy="6858000" type="screen4x3"/>
   <p:notesSz cx="6858000" cy="9144000"/>
@@ -166,6 +169,9 @@
             <p14:sldId id="366"/>
             <p14:sldId id="365"/>
             <p14:sldId id="368"/>
+            <p14:sldId id="369"/>
+            <p14:sldId id="371"/>
+            <p14:sldId id="372"/>
             <p14:sldId id="331"/>
             <p14:sldId id="332"/>
             <p14:sldId id="333"/>
@@ -279,7 +285,7 @@
           <a:p>
             <a:fld id="{26004F41-C1A1-4B0D-9EEE-5E3F0E5BC108}" type="datetimeFigureOut">
               <a:rPr lang="en-SG" smtClean="0"/>
-              <a:t>3/20/2017</a:t>
+              <a:t>3/31/2017</a:t>
             </a:fld>
             <a:endParaRPr lang="en-SG"/>
           </a:p>
@@ -726,7 +732,7 @@
           <a:p>
             <a:fld id="{699DC775-C286-4358-8C92-D7E584E969B3}" type="datetimeFigureOut">
               <a:rPr lang="en-US" smtClean="0"/>
-              <a:t>3/20/2017</a:t>
+              <a:t>3/31/2017</a:t>
             </a:fld>
             <a:endParaRPr lang="en-US"/>
           </a:p>
@@ -894,7 +900,7 @@
           <a:p>
             <a:fld id="{699DC775-C286-4358-8C92-D7E584E969B3}" type="datetimeFigureOut">
               <a:rPr lang="en-US" smtClean="0"/>
-              <a:t>3/20/2017</a:t>
+              <a:t>3/31/2017</a:t>
             </a:fld>
             <a:endParaRPr lang="en-US"/>
           </a:p>
@@ -1072,7 +1078,7 @@
           <a:p>
             <a:fld id="{699DC775-C286-4358-8C92-D7E584E969B3}" type="datetimeFigureOut">
               <a:rPr lang="en-US" smtClean="0"/>
-              <a:t>3/20/2017</a:t>
+              <a:t>3/31/2017</a:t>
             </a:fld>
             <a:endParaRPr lang="en-US"/>
           </a:p>
@@ -1312,7 +1318,7 @@
           <a:p>
             <a:fld id="{699DC775-C286-4358-8C92-D7E584E969B3}" type="datetimeFigureOut">
               <a:rPr lang="en-US" smtClean="0"/>
-              <a:t>3/20/2017</a:t>
+              <a:t>3/31/2017</a:t>
             </a:fld>
             <a:endParaRPr lang="en-US"/>
           </a:p>
@@ -1480,7 +1486,7 @@
           <a:p>
             <a:fld id="{699DC775-C286-4358-8C92-D7E584E969B3}" type="datetimeFigureOut">
               <a:rPr lang="en-US" smtClean="0"/>
-              <a:t>3/20/2017</a:t>
+              <a:t>3/31/2017</a:t>
             </a:fld>
             <a:endParaRPr lang="en-US"/>
           </a:p>
@@ -1725,7 +1731,7 @@
           <a:p>
             <a:fld id="{699DC775-C286-4358-8C92-D7E584E969B3}" type="datetimeFigureOut">
               <a:rPr lang="en-US" smtClean="0"/>
-              <a:t>3/20/2017</a:t>
+              <a:t>3/31/2017</a:t>
             </a:fld>
             <a:endParaRPr lang="en-US"/>
           </a:p>
@@ -2010,7 +2016,7 @@
           <a:p>
             <a:fld id="{699DC775-C286-4358-8C92-D7E584E969B3}" type="datetimeFigureOut">
               <a:rPr lang="en-US" smtClean="0"/>
-              <a:t>3/20/2017</a:t>
+              <a:t>3/31/2017</a:t>
             </a:fld>
             <a:endParaRPr lang="en-US"/>
           </a:p>
@@ -2429,7 +2435,7 @@
           <a:p>
             <a:fld id="{699DC775-C286-4358-8C92-D7E584E969B3}" type="datetimeFigureOut">
               <a:rPr lang="en-US" smtClean="0"/>
-              <a:t>3/20/2017</a:t>
+              <a:t>3/31/2017</a:t>
             </a:fld>
             <a:endParaRPr lang="en-US"/>
           </a:p>
@@ -2546,7 +2552,7 @@
           <a:p>
             <a:fld id="{699DC775-C286-4358-8C92-D7E584E969B3}" type="datetimeFigureOut">
               <a:rPr lang="en-US" smtClean="0"/>
-              <a:t>3/20/2017</a:t>
+              <a:t>3/31/2017</a:t>
             </a:fld>
             <a:endParaRPr lang="en-US"/>
           </a:p>
@@ -2641,7 +2647,7 @@
           <a:p>
             <a:fld id="{699DC775-C286-4358-8C92-D7E584E969B3}" type="datetimeFigureOut">
               <a:rPr lang="en-US" smtClean="0"/>
-              <a:t>3/20/2017</a:t>
+              <a:t>3/31/2017</a:t>
             </a:fld>
             <a:endParaRPr lang="en-US"/>
           </a:p>
@@ -2916,7 +2922,7 @@
           <a:p>
             <a:fld id="{699DC775-C286-4358-8C92-D7E584E969B3}" type="datetimeFigureOut">
               <a:rPr lang="en-US" smtClean="0"/>
-              <a:t>3/20/2017</a:t>
+              <a:t>3/31/2017</a:t>
             </a:fld>
             <a:endParaRPr lang="en-US"/>
           </a:p>
@@ -3084,7 +3090,7 @@
           <a:p>
             <a:fld id="{699DC775-C286-4358-8C92-D7E584E969B3}" type="datetimeFigureOut">
               <a:rPr lang="en-US" smtClean="0"/>
-              <a:t>3/20/2017</a:t>
+              <a:t>3/31/2017</a:t>
             </a:fld>
             <a:endParaRPr lang="en-US"/>
           </a:p>
@@ -3336,7 +3342,7 @@
           <a:p>
             <a:fld id="{699DC775-C286-4358-8C92-D7E584E969B3}" type="datetimeFigureOut">
               <a:rPr lang="en-US" smtClean="0"/>
-              <a:t>3/20/2017</a:t>
+              <a:t>3/31/2017</a:t>
             </a:fld>
             <a:endParaRPr lang="en-US"/>
           </a:p>
@@ -3504,7 +3510,7 @@
           <a:p>
             <a:fld id="{699DC775-C286-4358-8C92-D7E584E969B3}" type="datetimeFigureOut">
               <a:rPr lang="en-US" smtClean="0"/>
-              <a:t>3/20/2017</a:t>
+              <a:t>3/31/2017</a:t>
             </a:fld>
             <a:endParaRPr lang="en-US"/>
           </a:p>
@@ -3682,7 +3688,7 @@
           <a:p>
             <a:fld id="{699DC775-C286-4358-8C92-D7E584E969B3}" type="datetimeFigureOut">
               <a:rPr lang="en-US" smtClean="0"/>
-              <a:t>3/20/2017</a:t>
+              <a:t>3/31/2017</a:t>
             </a:fld>
             <a:endParaRPr lang="en-US"/>
           </a:p>
@@ -3930,7 +3936,7 @@
           <a:p>
             <a:fld id="{699DC775-C286-4358-8C92-D7E584E969B3}" type="datetimeFigureOut">
               <a:rPr lang="en-US" smtClean="0"/>
-              <a:t>3/20/2017</a:t>
+              <a:t>3/31/2017</a:t>
             </a:fld>
             <a:endParaRPr lang="en-US"/>
           </a:p>
@@ -4106,7 +4112,7 @@
           <a:p>
             <a:fld id="{699DC775-C286-4358-8C92-D7E584E969B3}" type="datetimeFigureOut">
               <a:rPr lang="en-US" smtClean="0"/>
-              <a:t>3/20/2017</a:t>
+              <a:t>3/31/2017</a:t>
             </a:fld>
             <a:endParaRPr lang="en-US"/>
           </a:p>
@@ -4359,7 +4365,7 @@
           <a:p>
             <a:fld id="{699DC775-C286-4358-8C92-D7E584E969B3}" type="datetimeFigureOut">
               <a:rPr lang="en-US" smtClean="0"/>
-              <a:t>3/20/2017</a:t>
+              <a:t>3/31/2017</a:t>
             </a:fld>
             <a:endParaRPr lang="en-US"/>
           </a:p>
@@ -4652,7 +4658,7 @@
           <a:p>
             <a:fld id="{699DC775-C286-4358-8C92-D7E584E969B3}" type="datetimeFigureOut">
               <a:rPr lang="en-US" smtClean="0"/>
-              <a:t>3/20/2017</a:t>
+              <a:t>3/31/2017</a:t>
             </a:fld>
             <a:endParaRPr lang="en-US"/>
           </a:p>
@@ -5079,7 +5085,7 @@
           <a:p>
             <a:fld id="{699DC775-C286-4358-8C92-D7E584E969B3}" type="datetimeFigureOut">
               <a:rPr lang="en-US" smtClean="0"/>
-              <a:t>3/20/2017</a:t>
+              <a:t>3/31/2017</a:t>
             </a:fld>
             <a:endParaRPr lang="en-US"/>
           </a:p>
@@ -5204,7 +5210,7 @@
           <a:p>
             <a:fld id="{699DC775-C286-4358-8C92-D7E584E969B3}" type="datetimeFigureOut">
               <a:rPr lang="en-US" smtClean="0"/>
-              <a:t>3/20/2017</a:t>
+              <a:t>3/31/2017</a:t>
             </a:fld>
             <a:endParaRPr lang="en-US"/>
           </a:p>
@@ -5307,7 +5313,7 @@
           <a:p>
             <a:fld id="{699DC775-C286-4358-8C92-D7E584E969B3}" type="datetimeFigureOut">
               <a:rPr lang="en-US" smtClean="0"/>
-              <a:t>3/20/2017</a:t>
+              <a:t>3/31/2017</a:t>
             </a:fld>
             <a:endParaRPr lang="en-US"/>
           </a:p>
@@ -5552,7 +5558,7 @@
           <a:p>
             <a:fld id="{699DC775-C286-4358-8C92-D7E584E969B3}" type="datetimeFigureOut">
               <a:rPr lang="en-US" smtClean="0"/>
-              <a:t>3/20/2017</a:t>
+              <a:t>3/31/2017</a:t>
             </a:fld>
             <a:endParaRPr lang="en-US"/>
           </a:p>
@@ -5835,7 +5841,7 @@
           <a:p>
             <a:fld id="{699DC775-C286-4358-8C92-D7E584E969B3}" type="datetimeFigureOut">
               <a:rPr lang="en-US" smtClean="0"/>
-              <a:t>3/20/2017</a:t>
+              <a:t>3/31/2017</a:t>
             </a:fld>
             <a:endParaRPr lang="en-US"/>
           </a:p>
@@ -6095,7 +6101,7 @@
           <a:p>
             <a:fld id="{699DC775-C286-4358-8C92-D7E584E969B3}" type="datetimeFigureOut">
               <a:rPr lang="en-US" smtClean="0"/>
-              <a:t>3/20/2017</a:t>
+              <a:t>3/31/2017</a:t>
             </a:fld>
             <a:endParaRPr lang="en-US"/>
           </a:p>
@@ -6271,7 +6277,7 @@
           <a:p>
             <a:fld id="{699DC775-C286-4358-8C92-D7E584E969B3}" type="datetimeFigureOut">
               <a:rPr lang="en-US" smtClean="0"/>
-              <a:t>3/20/2017</a:t>
+              <a:t>3/31/2017</a:t>
             </a:fld>
             <a:endParaRPr lang="en-US"/>
           </a:p>
@@ -6457,7 +6463,7 @@
           <a:p>
             <a:fld id="{699DC775-C286-4358-8C92-D7E584E969B3}" type="datetimeFigureOut">
               <a:rPr lang="en-US" smtClean="0"/>
-              <a:t>3/20/2017</a:t>
+              <a:t>3/31/2017</a:t>
             </a:fld>
             <a:endParaRPr lang="en-US"/>
           </a:p>
@@ -6742,7 +6748,7 @@
           <a:p>
             <a:fld id="{699DC775-C286-4358-8C92-D7E584E969B3}" type="datetimeFigureOut">
               <a:rPr lang="en-US" smtClean="0"/>
-              <a:t>3/20/2017</a:t>
+              <a:t>3/31/2017</a:t>
             </a:fld>
             <a:endParaRPr lang="en-US"/>
           </a:p>
@@ -7161,7 +7167,7 @@
           <a:p>
             <a:fld id="{699DC775-C286-4358-8C92-D7E584E969B3}" type="datetimeFigureOut">
               <a:rPr lang="en-US" smtClean="0"/>
-              <a:t>3/20/2017</a:t>
+              <a:t>3/31/2017</a:t>
             </a:fld>
             <a:endParaRPr lang="en-US"/>
           </a:p>
@@ -7278,7 +7284,7 @@
           <a:p>
             <a:fld id="{699DC775-C286-4358-8C92-D7E584E969B3}" type="datetimeFigureOut">
               <a:rPr lang="en-US" smtClean="0"/>
-              <a:t>3/20/2017</a:t>
+              <a:t>3/31/2017</a:t>
             </a:fld>
             <a:endParaRPr lang="en-US"/>
           </a:p>
@@ -7373,7 +7379,7 @@
           <a:p>
             <a:fld id="{699DC775-C286-4358-8C92-D7E584E969B3}" type="datetimeFigureOut">
               <a:rPr lang="en-US" smtClean="0"/>
-              <a:t>3/20/2017</a:t>
+              <a:t>3/31/2017</a:t>
             </a:fld>
             <a:endParaRPr lang="en-US"/>
           </a:p>
@@ -7648,7 +7654,7 @@
           <a:p>
             <a:fld id="{699DC775-C286-4358-8C92-D7E584E969B3}" type="datetimeFigureOut">
               <a:rPr lang="en-US" smtClean="0"/>
-              <a:t>3/20/2017</a:t>
+              <a:t>3/31/2017</a:t>
             </a:fld>
             <a:endParaRPr lang="en-US"/>
           </a:p>
@@ -7900,7 +7906,7 @@
           <a:p>
             <a:fld id="{699DC775-C286-4358-8C92-D7E584E969B3}" type="datetimeFigureOut">
               <a:rPr lang="en-US" smtClean="0"/>
-              <a:t>3/20/2017</a:t>
+              <a:t>3/31/2017</a:t>
             </a:fld>
             <a:endParaRPr lang="en-US"/>
           </a:p>
@@ -8111,7 +8117,7 @@
           <a:p>
             <a:fld id="{699DC775-C286-4358-8C92-D7E584E969B3}" type="datetimeFigureOut">
               <a:rPr lang="en-US" smtClean="0"/>
-              <a:t>3/20/2017</a:t>
+              <a:t>3/31/2017</a:t>
             </a:fld>
             <a:endParaRPr lang="en-US"/>
           </a:p>
@@ -8624,7 +8630,7 @@
           <a:p>
             <a:fld id="{699DC775-C286-4358-8C92-D7E584E969B3}" type="datetimeFigureOut">
               <a:rPr lang="en-US" smtClean="0"/>
-              <a:t>3/20/2017</a:t>
+              <a:t>3/31/2017</a:t>
             </a:fld>
             <a:endParaRPr lang="en-US"/>
           </a:p>
@@ -9135,7 +9141,7 @@
           <a:p>
             <a:fld id="{699DC775-C286-4358-8C92-D7E584E969B3}" type="datetimeFigureOut">
               <a:rPr lang="en-US" smtClean="0"/>
-              <a:t>3/20/2017</a:t>
+              <a:t>3/31/2017</a:t>
             </a:fld>
             <a:endParaRPr lang="en-US"/>
           </a:p>
@@ -10957,6 +10963,304 @@
           <a:p>
             <a:r>
               <a:rPr lang="en-US" dirty="0"/>
+              <a:t>Auto Crop:: Custom Anchor</a:t>
+            </a:r>
+            <a:endParaRPr lang="en-SG" dirty="0"/>
+          </a:p>
+        </p:txBody>
+      </p:sp>
+      <p:sp>
+        <p:nvSpPr>
+          <p:cNvPr id="3" name="Content Placeholder 2"/>
+          <p:cNvSpPr>
+            <a:spLocks noGrp="1"/>
+          </p:cNvSpPr>
+          <p:nvPr>
+            <p:ph idx="1"/>
+          </p:nvPr>
+        </p:nvSpPr>
+        <p:spPr/>
+        <p:txBody>
+          <a:bodyPr/>
+          <a:lstStyle/>
+          <a:p>
+            <a:endParaRPr lang="en-SG" dirty="0"/>
+          </a:p>
+        </p:txBody>
+      </p:sp>
+    </p:spTree>
+    <p:extLst>
+      <p:ext uri="{BB962C8B-B14F-4D97-AF65-F5344CB8AC3E}">
+        <p14:creationId xmlns:p14="http://schemas.microsoft.com/office/powerpoint/2010/main" val="2505799667"/>
+      </p:ext>
+    </p:extLst>
+  </p:cSld>
+  <p:clrMapOvr>
+    <a:masterClrMapping/>
+  </p:clrMapOvr>
+</p:sld>
+</file>
+
+<file path=ppt/slides/slide22.xml><?xml version="1.0" encoding="utf-8"?>
+<p:sld xmlns:a="http://schemas.openxmlformats.org/drawingml/2006/main" xmlns:r="http://schemas.openxmlformats.org/officeDocument/2006/relationships" xmlns:p="http://schemas.openxmlformats.org/presentationml/2006/main">
+  <p:cSld>
+    <p:bg>
+      <p:bgPr>
+        <a:solidFill>
+          <a:schemeClr val="bg1"/>
+        </a:solidFill>
+        <a:effectLst/>
+      </p:bgPr>
+    </p:bg>
+    <p:spTree>
+      <p:nvGrpSpPr>
+        <p:cNvPr id="1" name=""/>
+        <p:cNvGrpSpPr/>
+        <p:nvPr/>
+      </p:nvGrpSpPr>
+      <p:grpSpPr>
+        <a:xfrm>
+          <a:off x="0" y="0"/>
+          <a:ext cx="0" cy="0"/>
+          <a:chOff x="0" y="0"/>
+          <a:chExt cx="0" cy="0"/>
+        </a:xfrm>
+      </p:grpSpPr>
+      <p:pic>
+        <p:nvPicPr>
+          <p:cNvPr id="5" name="selectMe2"/>
+          <p:cNvPicPr>
+            <a:picLocks noChangeAspect="1"/>
+          </p:cNvPicPr>
+          <p:nvPr/>
+        </p:nvPicPr>
+        <p:blipFill>
+          <a:blip r:embed="rId2" cstate="print">
+            <a:extLst>
+              <a:ext uri="{28A0092B-C50C-407E-A947-70E740481C1C}">
+                <a14:useLocalDpi xmlns:a14="http://schemas.microsoft.com/office/drawing/2010/main" val="0"/>
+              </a:ext>
+            </a:extLst>
+          </a:blip>
+          <a:stretch>
+            <a:fillRect/>
+          </a:stretch>
+        </p:blipFill>
+        <p:spPr>
+          <a:xfrm>
+            <a:off x="381000" y="1095152"/>
+            <a:ext cx="3276600" cy="2191866"/>
+          </a:xfrm>
+          <a:prstGeom prst="rect">
+            <a:avLst/>
+          </a:prstGeom>
+        </p:spPr>
+      </p:pic>
+      <p:pic>
+        <p:nvPicPr>
+          <p:cNvPr id="3" name="selectMe1"/>
+          <p:cNvPicPr>
+            <a:picLocks noChangeAspect="1"/>
+          </p:cNvPicPr>
+          <p:nvPr/>
+        </p:nvPicPr>
+        <p:blipFill>
+          <a:blip r:embed="rId3">
+            <a:extLst>
+              <a:ext uri="{28A0092B-C50C-407E-A947-70E740481C1C}">
+                <a14:useLocalDpi xmlns:a14="http://schemas.microsoft.com/office/drawing/2010/main" val="0"/>
+              </a:ext>
+            </a:extLst>
+          </a:blip>
+          <a:stretch>
+            <a:fillRect/>
+          </a:stretch>
+        </p:blipFill>
+        <p:spPr>
+          <a:xfrm>
+            <a:off x="4343400" y="3505200"/>
+            <a:ext cx="4572000" cy="3058418"/>
+          </a:xfrm>
+          <a:prstGeom prst="rect">
+            <a:avLst/>
+          </a:prstGeom>
+        </p:spPr>
+      </p:pic>
+    </p:spTree>
+    <p:extLst>
+      <p:ext uri="{BB962C8B-B14F-4D97-AF65-F5344CB8AC3E}">
+        <p14:creationId xmlns:p14="http://schemas.microsoft.com/office/powerpoint/2010/main" val="4278097101"/>
+      </p:ext>
+    </p:extLst>
+  </p:cSld>
+  <p:clrMapOvr>
+    <a:masterClrMapping/>
+  </p:clrMapOvr>
+</p:sld>
+</file>
+
+<file path=ppt/slides/slide23.xml><?xml version="1.0" encoding="utf-8"?>
+<p:sld xmlns:a="http://schemas.openxmlformats.org/drawingml/2006/main" xmlns:r="http://schemas.openxmlformats.org/officeDocument/2006/relationships" xmlns:p="http://schemas.openxmlformats.org/presentationml/2006/main">
+  <p:cSld>
+    <p:bg>
+      <p:bgPr>
+        <a:solidFill>
+          <a:schemeClr val="bg1"/>
+        </a:solidFill>
+        <a:effectLst/>
+      </p:bgPr>
+    </p:bg>
+    <p:spTree>
+      <p:nvGrpSpPr>
+        <p:cNvPr id="1" name=""/>
+        <p:cNvGrpSpPr/>
+        <p:nvPr/>
+      </p:nvGrpSpPr>
+      <p:grpSpPr>
+        <a:xfrm>
+          <a:off x="0" y="0"/>
+          <a:ext cx="0" cy="0"/>
+          <a:chOff x="0" y="0"/>
+          <a:chExt cx="0" cy="0"/>
+        </a:xfrm>
+      </p:grpSpPr>
+      <p:pic>
+        <p:nvPicPr>
+          <p:cNvPr id="5" name="selectMe2"/>
+          <p:cNvPicPr>
+            <a:picLocks noChangeAspect="1"/>
+          </p:cNvPicPr>
+          <p:nvPr/>
+        </p:nvPicPr>
+        <p:blipFill>
+          <a:blip r:embed="rId2" cstate="print">
+            <a:extLst>
+              <a:ext uri="{28A0092B-C50C-407E-A947-70E740481C1C}">
+                <a14:useLocalDpi xmlns:a14="http://schemas.microsoft.com/office/drawing/2010/main" val="0"/>
+              </a:ext>
+            </a:extLst>
+          </a:blip>
+          <a:stretch>
+            <a:fillRect/>
+          </a:stretch>
+        </p:blipFill>
+        <p:spPr>
+          <a:xfrm>
+            <a:off x="381000" y="1095152"/>
+            <a:ext cx="3276600" cy="2191866"/>
+          </a:xfrm>
+          <a:prstGeom prst="rect">
+            <a:avLst/>
+          </a:prstGeom>
+        </p:spPr>
+      </p:pic>
+      <p:pic>
+        <p:nvPicPr>
+          <p:cNvPr id="3" name="selectMe1"/>
+          <p:cNvPicPr>
+            <a:picLocks noChangeAspect="1"/>
+          </p:cNvPicPr>
+          <p:nvPr/>
+        </p:nvPicPr>
+        <p:blipFill>
+          <a:blip r:embed="rId3">
+            <a:extLst>
+              <a:ext uri="{28A0092B-C50C-407E-A947-70E740481C1C}">
+                <a14:useLocalDpi xmlns:a14="http://schemas.microsoft.com/office/drawing/2010/main" val="0"/>
+              </a:ext>
+            </a:extLst>
+          </a:blip>
+          <a:srcRect l="28333" t="28333"/>
+          <a:stretch>
+            <a:fillRect/>
+          </a:stretch>
+        </p:blipFill>
+        <p:spPr>
+          <a:xfrm>
+            <a:off x="5638799" y="4371751"/>
+            <a:ext cx="3276601" cy="2191867"/>
+          </a:xfrm>
+          <a:prstGeom prst="rect">
+            <a:avLst/>
+          </a:prstGeom>
+        </p:spPr>
+      </p:pic>
+      <p:sp>
+        <p:nvSpPr>
+          <p:cNvPr id="4" name="text"/>
+          <p:cNvSpPr txBox="1"/>
+          <p:nvPr/>
+        </p:nvSpPr>
+        <p:spPr>
+          <a:xfrm>
+            <a:off x="8101022" y="0"/>
+            <a:ext cx="1042978" cy="369332"/>
+          </a:xfrm>
+          <a:prstGeom prst="rect">
+            <a:avLst/>
+          </a:prstGeom>
+          <a:noFill/>
+        </p:spPr>
+        <p:txBody>
+          <a:bodyPr wrap="none" rtlCol="0">
+            <a:spAutoFit/>
+          </a:bodyPr>
+          <a:lstStyle/>
+          <a:p>
+            <a:r>
+              <a:rPr lang="en-SG" dirty="0"/>
+              <a:t>Expected</a:t>
+            </a:r>
+          </a:p>
+        </p:txBody>
+      </p:sp>
+    </p:spTree>
+    <p:extLst>
+      <p:ext uri="{BB962C8B-B14F-4D97-AF65-F5344CB8AC3E}">
+        <p14:creationId xmlns:p14="http://schemas.microsoft.com/office/powerpoint/2010/main" val="4191781960"/>
+      </p:ext>
+    </p:extLst>
+  </p:cSld>
+  <p:clrMapOvr>
+    <a:masterClrMapping/>
+  </p:clrMapOvr>
+</p:sld>
+</file>
+
+<file path=ppt/slides/slide24.xml><?xml version="1.0" encoding="utf-8"?>
+<p:sld xmlns:a="http://schemas.openxmlformats.org/drawingml/2006/main" xmlns:r="http://schemas.openxmlformats.org/officeDocument/2006/relationships" xmlns:p="http://schemas.openxmlformats.org/presentationml/2006/main">
+  <p:cSld>
+    <p:spTree>
+      <p:nvGrpSpPr>
+        <p:cNvPr id="1" name=""/>
+        <p:cNvGrpSpPr/>
+        <p:nvPr/>
+      </p:nvGrpSpPr>
+      <p:grpSpPr>
+        <a:xfrm>
+          <a:off x="0" y="0"/>
+          <a:ext cx="0" cy="0"/>
+          <a:chOff x="0" y="0"/>
+          <a:chExt cx="0" cy="0"/>
+        </a:xfrm>
+      </p:grpSpPr>
+      <p:sp>
+        <p:nvSpPr>
+          <p:cNvPr id="2" name="Title 1"/>
+          <p:cNvSpPr>
+            <a:spLocks noGrp="1"/>
+          </p:cNvSpPr>
+          <p:nvPr>
+            <p:ph type="title"/>
+          </p:nvPr>
+        </p:nvSpPr>
+        <p:spPr/>
+        <p:txBody>
+          <a:bodyPr/>
+          <a:lstStyle/>
+          <a:p>
+            <a:r>
+              <a:rPr lang="en-US" dirty="0"/>
               <a:t>Auto Crop:: non-picture selected</a:t>
             </a:r>
             <a:endParaRPr lang="en-SG" dirty="0"/>
@@ -10998,7 +11302,7 @@
 </p:sld>
 </file>
 
-<file path=ppt/slides/slide22.xml><?xml version="1.0" encoding="utf-8"?>
+<file path=ppt/slides/slide25.xml><?xml version="1.0" encoding="utf-8"?>
 <p:sld xmlns:a="http://schemas.openxmlformats.org/drawingml/2006/main" xmlns:r="http://schemas.openxmlformats.org/officeDocument/2006/relationships" xmlns:p="http://schemas.openxmlformats.org/presentationml/2006/main">
   <p:cSld>
     <p:spTree>
@@ -11108,7 +11412,7 @@
 </p:sld>
 </file>
 
-<file path=ppt/slides/slide23.xml><?xml version="1.0" encoding="utf-8"?>
+<file path=ppt/slides/slide26.xml><?xml version="1.0" encoding="utf-8"?>
 <p:sld xmlns:a="http://schemas.openxmlformats.org/drawingml/2006/main" xmlns:r="http://schemas.openxmlformats.org/officeDocument/2006/relationships" xmlns:p="http://schemas.openxmlformats.org/presentationml/2006/main">
   <p:cSld>
     <p:spTree>
@@ -11186,7 +11490,7 @@
 </p:sld>
 </file>
 
-<file path=ppt/slides/slide24.xml><?xml version="1.0" encoding="utf-8"?>
+<file path=ppt/slides/slide27.xml><?xml version="1.0" encoding="utf-8"?>
 <p:sld xmlns:a="http://schemas.openxmlformats.org/drawingml/2006/main" xmlns:r="http://schemas.openxmlformats.org/officeDocument/2006/relationships" xmlns:p="http://schemas.openxmlformats.org/presentationml/2006/main">
   <p:cSld>
     <p:spTree>
@@ -11216,7 +11520,7 @@
 </p:sld>
 </file>
 
-<file path=ppt/slides/slide25.xml><?xml version="1.0" encoding="utf-8"?>
+<file path=ppt/slides/slide28.xml><?xml version="1.0" encoding="utf-8"?>
 <p:sld xmlns:a="http://schemas.openxmlformats.org/drawingml/2006/main" xmlns:r="http://schemas.openxmlformats.org/officeDocument/2006/relationships" xmlns:p="http://schemas.openxmlformats.org/presentationml/2006/main">
   <p:cSld>
     <p:spTree>
@@ -11288,7 +11592,7 @@
 </p:sld>
 </file>
 
-<file path=ppt/slides/slide26.xml><?xml version="1.0" encoding="utf-8"?>
+<file path=ppt/slides/slide29.xml><?xml version="1.0" encoding="utf-8"?>
 <p:sld xmlns:a="http://schemas.openxmlformats.org/drawingml/2006/main" xmlns:r="http://schemas.openxmlformats.org/officeDocument/2006/relationships" xmlns:p="http://schemas.openxmlformats.org/presentationml/2006/main">
   <p:cSld>
     <p:bg>
@@ -11386,7 +11690,7 @@
 </p:sld>
 </file>
 
-<file path=ppt/slides/slide27.xml><?xml version="1.0" encoding="utf-8"?>
+<file path=ppt/slides/slide3.xml><?xml version="1.0" encoding="utf-8"?>
 <p:sld xmlns:a="http://schemas.openxmlformats.org/drawingml/2006/main" xmlns:r="http://schemas.openxmlformats.org/officeDocument/2006/relationships" xmlns:p="http://schemas.openxmlformats.org/presentationml/2006/main">
   <p:cSld>
     <p:spTree>
@@ -11420,6 +11724,59 @@
           <a:p>
             <a:r>
               <a:rPr lang="en-US" dirty="0"/>
+              <a:t>Auto Crop:: One edge cropped</a:t>
+            </a:r>
+            <a:endParaRPr lang="en-SG" dirty="0"/>
+          </a:p>
+        </p:txBody>
+      </p:sp>
+    </p:spTree>
+    <p:extLst>
+      <p:ext uri="{BB962C8B-B14F-4D97-AF65-F5344CB8AC3E}">
+        <p14:creationId xmlns:p14="http://schemas.microsoft.com/office/powerpoint/2010/main" val="2406691133"/>
+      </p:ext>
+    </p:extLst>
+  </p:cSld>
+  <p:clrMapOvr>
+    <a:masterClrMapping/>
+  </p:clrMapOvr>
+</p:sld>
+</file>
+
+<file path=ppt/slides/slide30.xml><?xml version="1.0" encoding="utf-8"?>
+<p:sld xmlns:a="http://schemas.openxmlformats.org/drawingml/2006/main" xmlns:r="http://schemas.openxmlformats.org/officeDocument/2006/relationships" xmlns:p="http://schemas.openxmlformats.org/presentationml/2006/main">
+  <p:cSld>
+    <p:spTree>
+      <p:nvGrpSpPr>
+        <p:cNvPr id="1" name=""/>
+        <p:cNvGrpSpPr/>
+        <p:nvPr/>
+      </p:nvGrpSpPr>
+      <p:grpSpPr>
+        <a:xfrm>
+          <a:off x="0" y="0"/>
+          <a:ext cx="0" cy="0"/>
+          <a:chOff x="0" y="0"/>
+          <a:chExt cx="0" cy="0"/>
+        </a:xfrm>
+      </p:grpSpPr>
+      <p:sp>
+        <p:nvSpPr>
+          <p:cNvPr id="2" name="Title 1"/>
+          <p:cNvSpPr>
+            <a:spLocks noGrp="1"/>
+          </p:cNvSpPr>
+          <p:nvPr>
+            <p:ph type="title"/>
+          </p:nvPr>
+        </p:nvSpPr>
+        <p:spPr/>
+        <p:txBody>
+          <a:bodyPr/>
+          <a:lstStyle/>
+          <a:p>
+            <a:r>
+              <a:rPr lang="en-US" dirty="0"/>
               <a:t>Auto Crop:: Larger reference image</a:t>
             </a:r>
             <a:endParaRPr lang="en-SG" dirty="0"/>
@@ -11458,7 +11815,7 @@
 </p:sld>
 </file>
 
-<file path=ppt/slides/slide28.xml><?xml version="1.0" encoding="utf-8"?>
+<file path=ppt/slides/slide31.xml><?xml version="1.0" encoding="utf-8"?>
 <p:sld xmlns:a="http://schemas.openxmlformats.org/drawingml/2006/main" xmlns:r="http://schemas.openxmlformats.org/officeDocument/2006/relationships" xmlns:p="http://schemas.openxmlformats.org/presentationml/2006/main">
   <p:cSld>
     <p:bg>
@@ -11556,7 +11913,7 @@
 </p:sld>
 </file>
 
-<file path=ppt/slides/slide29.xml><?xml version="1.0" encoding="utf-8"?>
+<file path=ppt/slides/slide32.xml><?xml version="1.0" encoding="utf-8"?>
 <p:sld xmlns:a="http://schemas.openxmlformats.org/drawingml/2006/main" xmlns:r="http://schemas.openxmlformats.org/officeDocument/2006/relationships" xmlns:p="http://schemas.openxmlformats.org/presentationml/2006/main" show="0">
   <p:cSld>
     <p:spTree>
@@ -11625,59 +11982,6 @@
     <p:extLst>
       <p:ext uri="{BB962C8B-B14F-4D97-AF65-F5344CB8AC3E}">
         <p14:creationId xmlns:p14="http://schemas.microsoft.com/office/powerpoint/2010/main" val="2234878813"/>
-      </p:ext>
-    </p:extLst>
-  </p:cSld>
-  <p:clrMapOvr>
-    <a:masterClrMapping/>
-  </p:clrMapOvr>
-</p:sld>
-</file>
-
-<file path=ppt/slides/slide3.xml><?xml version="1.0" encoding="utf-8"?>
-<p:sld xmlns:a="http://schemas.openxmlformats.org/drawingml/2006/main" xmlns:r="http://schemas.openxmlformats.org/officeDocument/2006/relationships" xmlns:p="http://schemas.openxmlformats.org/presentationml/2006/main">
-  <p:cSld>
-    <p:spTree>
-      <p:nvGrpSpPr>
-        <p:cNvPr id="1" name=""/>
-        <p:cNvGrpSpPr/>
-        <p:nvPr/>
-      </p:nvGrpSpPr>
-      <p:grpSpPr>
-        <a:xfrm>
-          <a:off x="0" y="0"/>
-          <a:ext cx="0" cy="0"/>
-          <a:chOff x="0" y="0"/>
-          <a:chExt cx="0" cy="0"/>
-        </a:xfrm>
-      </p:grpSpPr>
-      <p:sp>
-        <p:nvSpPr>
-          <p:cNvPr id="2" name="Title 1"/>
-          <p:cNvSpPr>
-            <a:spLocks noGrp="1"/>
-          </p:cNvSpPr>
-          <p:nvPr>
-            <p:ph type="title"/>
-          </p:nvPr>
-        </p:nvSpPr>
-        <p:spPr/>
-        <p:txBody>
-          <a:bodyPr/>
-          <a:lstStyle/>
-          <a:p>
-            <a:r>
-              <a:rPr lang="en-US" dirty="0"/>
-              <a:t>Auto Crop:: One edge cropped</a:t>
-            </a:r>
-            <a:endParaRPr lang="en-SG" dirty="0"/>
-          </a:p>
-        </p:txBody>
-      </p:sp>
-    </p:spTree>
-    <p:extLst>
-      <p:ext uri="{BB962C8B-B14F-4D97-AF65-F5344CB8AC3E}">
-        <p14:creationId xmlns:p14="http://schemas.microsoft.com/office/powerpoint/2010/main" val="2406691133"/>
       </p:ext>
     </p:extLst>
   </p:cSld>

</xml_diff>

<commit_message>
Allow shape as reference object for Crop To Same Dimension
</commit_message>
<xml_diff>
--- a/doc/test/CropToSame.pptx
+++ b/doc/test/CropToSame.pptx
@@ -7,7 +7,7 @@
     <p:sldMasterId id="2147483672" r:id="rId3"/>
   </p:sldMasterIdLst>
   <p:notesMasterIdLst>
-    <p:notesMasterId r:id="rId36"/>
+    <p:notesMasterId r:id="rId39"/>
   </p:notesMasterIdLst>
   <p:sldIdLst>
     <p:sldId id="287" r:id="rId4"/>
@@ -41,7 +41,10 @@
     <p:sldId id="293" r:id="rId32"/>
     <p:sldId id="321" r:id="rId33"/>
     <p:sldId id="362" r:id="rId34"/>
-    <p:sldId id="318" r:id="rId35"/>
+    <p:sldId id="373" r:id="rId35"/>
+    <p:sldId id="374" r:id="rId36"/>
+    <p:sldId id="375" r:id="rId37"/>
+    <p:sldId id="318" r:id="rId38"/>
   </p:sldIdLst>
   <p:sldSz cx="9144000" cy="6858000" type="screen4x3"/>
   <p:notesSz cx="6858000" cy="9144000"/>
@@ -180,6 +183,9 @@
             <p14:sldId id="293"/>
             <p14:sldId id="321"/>
             <p14:sldId id="362"/>
+            <p14:sldId id="373"/>
+            <p14:sldId id="374"/>
+            <p14:sldId id="375"/>
             <p14:sldId id="318"/>
           </p14:sldIdLst>
         </p14:section>
@@ -201,6 +207,10 @@
     </p:ext>
   </p:extLst>
 </p:presentation>
+</file>
+
+<file path=ppt/revisionInfo.xml><?xml version="1.0" encoding="utf-8"?>
+<p1510:revInfo xmlns:a="http://schemas.openxmlformats.org/drawingml/2006/main" xmlns:r="http://schemas.openxmlformats.org/officeDocument/2006/relationships" xmlns:p1510="http://schemas.microsoft.com/office/powerpoint/2015/10/main"/>
 </file>
 
 <file path=ppt/notesMasters/notesMaster1.xml><?xml version="1.0" encoding="utf-8"?>
@@ -285,7 +295,7 @@
           <a:p>
             <a:fld id="{26004F41-C1A1-4B0D-9EEE-5E3F0E5BC108}" type="datetimeFigureOut">
               <a:rPr lang="en-SG" smtClean="0"/>
-              <a:t>3/31/2017</a:t>
+              <a:t>29/5/2017</a:t>
             </a:fld>
             <a:endParaRPr lang="en-SG"/>
           </a:p>
@@ -732,7 +742,7 @@
           <a:p>
             <a:fld id="{699DC775-C286-4358-8C92-D7E584E969B3}" type="datetimeFigureOut">
               <a:rPr lang="en-US" smtClean="0"/>
-              <a:t>3/31/2017</a:t>
+              <a:t>5/29/2017</a:t>
             </a:fld>
             <a:endParaRPr lang="en-US"/>
           </a:p>
@@ -900,7 +910,7 @@
           <a:p>
             <a:fld id="{699DC775-C286-4358-8C92-D7E584E969B3}" type="datetimeFigureOut">
               <a:rPr lang="en-US" smtClean="0"/>
-              <a:t>3/31/2017</a:t>
+              <a:t>5/29/2017</a:t>
             </a:fld>
             <a:endParaRPr lang="en-US"/>
           </a:p>
@@ -1078,7 +1088,7 @@
           <a:p>
             <a:fld id="{699DC775-C286-4358-8C92-D7E584E969B3}" type="datetimeFigureOut">
               <a:rPr lang="en-US" smtClean="0"/>
-              <a:t>3/31/2017</a:t>
+              <a:t>5/29/2017</a:t>
             </a:fld>
             <a:endParaRPr lang="en-US"/>
           </a:p>
@@ -1318,7 +1328,7 @@
           <a:p>
             <a:fld id="{699DC775-C286-4358-8C92-D7E584E969B3}" type="datetimeFigureOut">
               <a:rPr lang="en-US" smtClean="0"/>
-              <a:t>3/31/2017</a:t>
+              <a:t>5/29/2017</a:t>
             </a:fld>
             <a:endParaRPr lang="en-US"/>
           </a:p>
@@ -1486,7 +1496,7 @@
           <a:p>
             <a:fld id="{699DC775-C286-4358-8C92-D7E584E969B3}" type="datetimeFigureOut">
               <a:rPr lang="en-US" smtClean="0"/>
-              <a:t>3/31/2017</a:t>
+              <a:t>5/29/2017</a:t>
             </a:fld>
             <a:endParaRPr lang="en-US"/>
           </a:p>
@@ -1731,7 +1741,7 @@
           <a:p>
             <a:fld id="{699DC775-C286-4358-8C92-D7E584E969B3}" type="datetimeFigureOut">
               <a:rPr lang="en-US" smtClean="0"/>
-              <a:t>3/31/2017</a:t>
+              <a:t>5/29/2017</a:t>
             </a:fld>
             <a:endParaRPr lang="en-US"/>
           </a:p>
@@ -2016,7 +2026,7 @@
           <a:p>
             <a:fld id="{699DC775-C286-4358-8C92-D7E584E969B3}" type="datetimeFigureOut">
               <a:rPr lang="en-US" smtClean="0"/>
-              <a:t>3/31/2017</a:t>
+              <a:t>5/29/2017</a:t>
             </a:fld>
             <a:endParaRPr lang="en-US"/>
           </a:p>
@@ -2435,7 +2445,7 @@
           <a:p>
             <a:fld id="{699DC775-C286-4358-8C92-D7E584E969B3}" type="datetimeFigureOut">
               <a:rPr lang="en-US" smtClean="0"/>
-              <a:t>3/31/2017</a:t>
+              <a:t>5/29/2017</a:t>
             </a:fld>
             <a:endParaRPr lang="en-US"/>
           </a:p>
@@ -2552,7 +2562,7 @@
           <a:p>
             <a:fld id="{699DC775-C286-4358-8C92-D7E584E969B3}" type="datetimeFigureOut">
               <a:rPr lang="en-US" smtClean="0"/>
-              <a:t>3/31/2017</a:t>
+              <a:t>5/29/2017</a:t>
             </a:fld>
             <a:endParaRPr lang="en-US"/>
           </a:p>
@@ -2647,7 +2657,7 @@
           <a:p>
             <a:fld id="{699DC775-C286-4358-8C92-D7E584E969B3}" type="datetimeFigureOut">
               <a:rPr lang="en-US" smtClean="0"/>
-              <a:t>3/31/2017</a:t>
+              <a:t>5/29/2017</a:t>
             </a:fld>
             <a:endParaRPr lang="en-US"/>
           </a:p>
@@ -2922,7 +2932,7 @@
           <a:p>
             <a:fld id="{699DC775-C286-4358-8C92-D7E584E969B3}" type="datetimeFigureOut">
               <a:rPr lang="en-US" smtClean="0"/>
-              <a:t>3/31/2017</a:t>
+              <a:t>5/29/2017</a:t>
             </a:fld>
             <a:endParaRPr lang="en-US"/>
           </a:p>
@@ -3090,7 +3100,7 @@
           <a:p>
             <a:fld id="{699DC775-C286-4358-8C92-D7E584E969B3}" type="datetimeFigureOut">
               <a:rPr lang="en-US" smtClean="0"/>
-              <a:t>3/31/2017</a:t>
+              <a:t>5/29/2017</a:t>
             </a:fld>
             <a:endParaRPr lang="en-US"/>
           </a:p>
@@ -3342,7 +3352,7 @@
           <a:p>
             <a:fld id="{699DC775-C286-4358-8C92-D7E584E969B3}" type="datetimeFigureOut">
               <a:rPr lang="en-US" smtClean="0"/>
-              <a:t>3/31/2017</a:t>
+              <a:t>5/29/2017</a:t>
             </a:fld>
             <a:endParaRPr lang="en-US"/>
           </a:p>
@@ -3510,7 +3520,7 @@
           <a:p>
             <a:fld id="{699DC775-C286-4358-8C92-D7E584E969B3}" type="datetimeFigureOut">
               <a:rPr lang="en-US" smtClean="0"/>
-              <a:t>3/31/2017</a:t>
+              <a:t>5/29/2017</a:t>
             </a:fld>
             <a:endParaRPr lang="en-US"/>
           </a:p>
@@ -3688,7 +3698,7 @@
           <a:p>
             <a:fld id="{699DC775-C286-4358-8C92-D7E584E969B3}" type="datetimeFigureOut">
               <a:rPr lang="en-US" smtClean="0"/>
-              <a:t>3/31/2017</a:t>
+              <a:t>5/29/2017</a:t>
             </a:fld>
             <a:endParaRPr lang="en-US"/>
           </a:p>
@@ -3936,7 +3946,7 @@
           <a:p>
             <a:fld id="{699DC775-C286-4358-8C92-D7E584E969B3}" type="datetimeFigureOut">
               <a:rPr lang="en-US" smtClean="0"/>
-              <a:t>3/31/2017</a:t>
+              <a:t>5/29/2017</a:t>
             </a:fld>
             <a:endParaRPr lang="en-US"/>
           </a:p>
@@ -4112,7 +4122,7 @@
           <a:p>
             <a:fld id="{699DC775-C286-4358-8C92-D7E584E969B3}" type="datetimeFigureOut">
               <a:rPr lang="en-US" smtClean="0"/>
-              <a:t>3/31/2017</a:t>
+              <a:t>5/29/2017</a:t>
             </a:fld>
             <a:endParaRPr lang="en-US"/>
           </a:p>
@@ -4365,7 +4375,7 @@
           <a:p>
             <a:fld id="{699DC775-C286-4358-8C92-D7E584E969B3}" type="datetimeFigureOut">
               <a:rPr lang="en-US" smtClean="0"/>
-              <a:t>3/31/2017</a:t>
+              <a:t>5/29/2017</a:t>
             </a:fld>
             <a:endParaRPr lang="en-US"/>
           </a:p>
@@ -4658,7 +4668,7 @@
           <a:p>
             <a:fld id="{699DC775-C286-4358-8C92-D7E584E969B3}" type="datetimeFigureOut">
               <a:rPr lang="en-US" smtClean="0"/>
-              <a:t>3/31/2017</a:t>
+              <a:t>5/29/2017</a:t>
             </a:fld>
             <a:endParaRPr lang="en-US"/>
           </a:p>
@@ -5085,7 +5095,7 @@
           <a:p>
             <a:fld id="{699DC775-C286-4358-8C92-D7E584E969B3}" type="datetimeFigureOut">
               <a:rPr lang="en-US" smtClean="0"/>
-              <a:t>3/31/2017</a:t>
+              <a:t>5/29/2017</a:t>
             </a:fld>
             <a:endParaRPr lang="en-US"/>
           </a:p>
@@ -5210,7 +5220,7 @@
           <a:p>
             <a:fld id="{699DC775-C286-4358-8C92-D7E584E969B3}" type="datetimeFigureOut">
               <a:rPr lang="en-US" smtClean="0"/>
-              <a:t>3/31/2017</a:t>
+              <a:t>5/29/2017</a:t>
             </a:fld>
             <a:endParaRPr lang="en-US"/>
           </a:p>
@@ -5313,7 +5323,7 @@
           <a:p>
             <a:fld id="{699DC775-C286-4358-8C92-D7E584E969B3}" type="datetimeFigureOut">
               <a:rPr lang="en-US" smtClean="0"/>
-              <a:t>3/31/2017</a:t>
+              <a:t>5/29/2017</a:t>
             </a:fld>
             <a:endParaRPr lang="en-US"/>
           </a:p>
@@ -5558,7 +5568,7 @@
           <a:p>
             <a:fld id="{699DC775-C286-4358-8C92-D7E584E969B3}" type="datetimeFigureOut">
               <a:rPr lang="en-US" smtClean="0"/>
-              <a:t>3/31/2017</a:t>
+              <a:t>5/29/2017</a:t>
             </a:fld>
             <a:endParaRPr lang="en-US"/>
           </a:p>
@@ -5841,7 +5851,7 @@
           <a:p>
             <a:fld id="{699DC775-C286-4358-8C92-D7E584E969B3}" type="datetimeFigureOut">
               <a:rPr lang="en-US" smtClean="0"/>
-              <a:t>3/31/2017</a:t>
+              <a:t>5/29/2017</a:t>
             </a:fld>
             <a:endParaRPr lang="en-US"/>
           </a:p>
@@ -6101,7 +6111,7 @@
           <a:p>
             <a:fld id="{699DC775-C286-4358-8C92-D7E584E969B3}" type="datetimeFigureOut">
               <a:rPr lang="en-US" smtClean="0"/>
-              <a:t>3/31/2017</a:t>
+              <a:t>5/29/2017</a:t>
             </a:fld>
             <a:endParaRPr lang="en-US"/>
           </a:p>
@@ -6277,7 +6287,7 @@
           <a:p>
             <a:fld id="{699DC775-C286-4358-8C92-D7E584E969B3}" type="datetimeFigureOut">
               <a:rPr lang="en-US" smtClean="0"/>
-              <a:t>3/31/2017</a:t>
+              <a:t>5/29/2017</a:t>
             </a:fld>
             <a:endParaRPr lang="en-US"/>
           </a:p>
@@ -6463,7 +6473,7 @@
           <a:p>
             <a:fld id="{699DC775-C286-4358-8C92-D7E584E969B3}" type="datetimeFigureOut">
               <a:rPr lang="en-US" smtClean="0"/>
-              <a:t>3/31/2017</a:t>
+              <a:t>5/29/2017</a:t>
             </a:fld>
             <a:endParaRPr lang="en-US"/>
           </a:p>
@@ -6748,7 +6758,7 @@
           <a:p>
             <a:fld id="{699DC775-C286-4358-8C92-D7E584E969B3}" type="datetimeFigureOut">
               <a:rPr lang="en-US" smtClean="0"/>
-              <a:t>3/31/2017</a:t>
+              <a:t>5/29/2017</a:t>
             </a:fld>
             <a:endParaRPr lang="en-US"/>
           </a:p>
@@ -7167,7 +7177,7 @@
           <a:p>
             <a:fld id="{699DC775-C286-4358-8C92-D7E584E969B3}" type="datetimeFigureOut">
               <a:rPr lang="en-US" smtClean="0"/>
-              <a:t>3/31/2017</a:t>
+              <a:t>5/29/2017</a:t>
             </a:fld>
             <a:endParaRPr lang="en-US"/>
           </a:p>
@@ -7284,7 +7294,7 @@
           <a:p>
             <a:fld id="{699DC775-C286-4358-8C92-D7E584E969B3}" type="datetimeFigureOut">
               <a:rPr lang="en-US" smtClean="0"/>
-              <a:t>3/31/2017</a:t>
+              <a:t>5/29/2017</a:t>
             </a:fld>
             <a:endParaRPr lang="en-US"/>
           </a:p>
@@ -7379,7 +7389,7 @@
           <a:p>
             <a:fld id="{699DC775-C286-4358-8C92-D7E584E969B3}" type="datetimeFigureOut">
               <a:rPr lang="en-US" smtClean="0"/>
-              <a:t>3/31/2017</a:t>
+              <a:t>5/29/2017</a:t>
             </a:fld>
             <a:endParaRPr lang="en-US"/>
           </a:p>
@@ -7654,7 +7664,7 @@
           <a:p>
             <a:fld id="{699DC775-C286-4358-8C92-D7E584E969B3}" type="datetimeFigureOut">
               <a:rPr lang="en-US" smtClean="0"/>
-              <a:t>3/31/2017</a:t>
+              <a:t>5/29/2017</a:t>
             </a:fld>
             <a:endParaRPr lang="en-US"/>
           </a:p>
@@ -7906,7 +7916,7 @@
           <a:p>
             <a:fld id="{699DC775-C286-4358-8C92-D7E584E969B3}" type="datetimeFigureOut">
               <a:rPr lang="en-US" smtClean="0"/>
-              <a:t>3/31/2017</a:t>
+              <a:t>5/29/2017</a:t>
             </a:fld>
             <a:endParaRPr lang="en-US"/>
           </a:p>
@@ -8117,7 +8127,7 @@
           <a:p>
             <a:fld id="{699DC775-C286-4358-8C92-D7E584E969B3}" type="datetimeFigureOut">
               <a:rPr lang="en-US" smtClean="0"/>
-              <a:t>3/31/2017</a:t>
+              <a:t>5/29/2017</a:t>
             </a:fld>
             <a:endParaRPr lang="en-US"/>
           </a:p>
@@ -8630,7 +8640,7 @@
           <a:p>
             <a:fld id="{699DC775-C286-4358-8C92-D7E584E969B3}" type="datetimeFigureOut">
               <a:rPr lang="en-US" smtClean="0"/>
-              <a:t>3/31/2017</a:t>
+              <a:t>5/29/2017</a:t>
             </a:fld>
             <a:endParaRPr lang="en-US"/>
           </a:p>
@@ -9141,7 +9151,7 @@
           <a:p>
             <a:fld id="{699DC775-C286-4358-8C92-D7E584E969B3}" type="datetimeFigureOut">
               <a:rPr lang="en-US" smtClean="0"/>
-              <a:t>3/31/2017</a:t>
+              <a:t>5/29/2017</a:t>
             </a:fld>
             <a:endParaRPr lang="en-US"/>
           </a:p>
@@ -9901,7 +9911,7 @@
           <a:p>
             <a:r>
               <a:rPr lang="en-US" dirty="0"/>
-              <a:t>Auto Crop:: Smaller reference image</a:t>
+              <a:t>Crop To Same:: Smaller reference image</a:t>
             </a:r>
             <a:endParaRPr lang="en-SG" dirty="0"/>
           </a:p>
@@ -10199,7 +10209,7 @@
           <a:p>
             <a:r>
               <a:rPr lang="en-US" dirty="0"/>
-              <a:t>Auto Crop:: Wider but shorter reference image</a:t>
+              <a:t>Crop To Same:: Wider but shorter reference image</a:t>
             </a:r>
             <a:endParaRPr lang="en-SG" dirty="0"/>
           </a:p>
@@ -10497,7 +10507,7 @@
           <a:p>
             <a:r>
               <a:rPr lang="en-US" dirty="0"/>
-              <a:t>Auto Crop:: Cropped image</a:t>
+              <a:t>Crop To Same:: Cropped image</a:t>
             </a:r>
             <a:br>
               <a:rPr lang="en-US" dirty="0"/>
@@ -10963,7 +10973,7 @@
           <a:p>
             <a:r>
               <a:rPr lang="en-US" dirty="0"/>
-              <a:t>Auto Crop:: Custom Anchor</a:t>
+              <a:t>Crop To Same:: Custom Anchor</a:t>
             </a:r>
             <a:endParaRPr lang="en-SG" dirty="0"/>
           </a:p>
@@ -11261,7 +11271,7 @@
           <a:p>
             <a:r>
               <a:rPr lang="en-US" dirty="0"/>
-              <a:t>Auto Crop:: non-picture selected</a:t>
+              <a:t>Crop To Same:: non-picture selected</a:t>
             </a:r>
             <a:endParaRPr lang="en-SG" dirty="0"/>
           </a:p>
@@ -11446,7 +11456,7 @@
           <a:p>
             <a:r>
               <a:rPr lang="en-US" dirty="0"/>
-              <a:t>Auto Crop:: nothing selected</a:t>
+              <a:t>Crop To Same:: nothing selected</a:t>
             </a:r>
             <a:endParaRPr lang="en-SG" dirty="0"/>
           </a:p>
@@ -11554,7 +11564,7 @@
           <a:p>
             <a:r>
               <a:rPr lang="en-US" dirty="0"/>
-              <a:t>Auto Crop:: Same picture</a:t>
+              <a:t>Crop To Same:: Same picture</a:t>
             </a:r>
             <a:endParaRPr lang="en-SG" dirty="0"/>
           </a:p>
@@ -11724,7 +11734,7 @@
           <a:p>
             <a:r>
               <a:rPr lang="en-US" dirty="0"/>
-              <a:t>Auto Crop:: One edge cropped</a:t>
+              <a:t>Crop To Same:: One edge cropped</a:t>
             </a:r>
             <a:endParaRPr lang="en-SG" dirty="0"/>
           </a:p>
@@ -11777,7 +11787,7 @@
           <a:p>
             <a:r>
               <a:rPr lang="en-US" dirty="0"/>
-              <a:t>Auto Crop:: Larger reference image</a:t>
+              <a:t>Crop To Same:: Larger reference image</a:t>
             </a:r>
             <a:endParaRPr lang="en-SG" dirty="0"/>
           </a:p>
@@ -11914,6 +11924,321 @@
 </file>
 
 <file path=ppt/slides/slide32.xml><?xml version="1.0" encoding="utf-8"?>
+<p:sld xmlns:a="http://schemas.openxmlformats.org/drawingml/2006/main" xmlns:r="http://schemas.openxmlformats.org/officeDocument/2006/relationships" xmlns:p="http://schemas.openxmlformats.org/presentationml/2006/main">
+  <p:cSld>
+    <p:spTree>
+      <p:nvGrpSpPr>
+        <p:cNvPr id="1" name=""/>
+        <p:cNvGrpSpPr/>
+        <p:nvPr/>
+      </p:nvGrpSpPr>
+      <p:grpSpPr>
+        <a:xfrm>
+          <a:off x="0" y="0"/>
+          <a:ext cx="0" cy="0"/>
+          <a:chOff x="0" y="0"/>
+          <a:chExt cx="0" cy="0"/>
+        </a:xfrm>
+      </p:grpSpPr>
+      <p:sp>
+        <p:nvSpPr>
+          <p:cNvPr id="2" name="Title 1"/>
+          <p:cNvSpPr>
+            <a:spLocks noGrp="1"/>
+          </p:cNvSpPr>
+          <p:nvPr>
+            <p:ph type="title"/>
+          </p:nvPr>
+        </p:nvSpPr>
+        <p:spPr/>
+        <p:txBody>
+          <a:bodyPr/>
+          <a:lstStyle/>
+          <a:p>
+            <a:r>
+              <a:rPr lang="en-US" dirty="0"/>
+              <a:t>Crop To Same:: Shape as reference object</a:t>
+            </a:r>
+            <a:endParaRPr lang="en-SG" dirty="0"/>
+          </a:p>
+        </p:txBody>
+      </p:sp>
+      <p:sp>
+        <p:nvSpPr>
+          <p:cNvPr id="3" name="Content Placeholder 2"/>
+          <p:cNvSpPr>
+            <a:spLocks noGrp="1"/>
+          </p:cNvSpPr>
+          <p:nvPr>
+            <p:ph idx="1"/>
+          </p:nvPr>
+        </p:nvSpPr>
+        <p:spPr/>
+        <p:txBody>
+          <a:bodyPr/>
+          <a:lstStyle/>
+          <a:p>
+            <a:endParaRPr lang="en-SG" dirty="0"/>
+          </a:p>
+        </p:txBody>
+      </p:sp>
+    </p:spTree>
+    <p:extLst>
+      <p:ext uri="{BB962C8B-B14F-4D97-AF65-F5344CB8AC3E}">
+        <p14:creationId xmlns:p14="http://schemas.microsoft.com/office/powerpoint/2010/main" val="814270024"/>
+      </p:ext>
+    </p:extLst>
+  </p:cSld>
+  <p:clrMapOvr>
+    <a:masterClrMapping/>
+  </p:clrMapOvr>
+</p:sld>
+</file>
+
+<file path=ppt/slides/slide33.xml><?xml version="1.0" encoding="utf-8"?>
+<p:sld xmlns:a="http://schemas.openxmlformats.org/drawingml/2006/main" xmlns:r="http://schemas.openxmlformats.org/officeDocument/2006/relationships" xmlns:p="http://schemas.openxmlformats.org/presentationml/2006/main">
+  <p:cSld>
+    <p:bg>
+      <p:bgPr>
+        <a:solidFill>
+          <a:schemeClr val="bg1"/>
+        </a:solidFill>
+        <a:effectLst/>
+      </p:bgPr>
+    </p:bg>
+    <p:spTree>
+      <p:nvGrpSpPr>
+        <p:cNvPr id="1" name=""/>
+        <p:cNvGrpSpPr/>
+        <p:nvPr/>
+      </p:nvGrpSpPr>
+      <p:grpSpPr>
+        <a:xfrm>
+          <a:off x="0" y="0"/>
+          <a:ext cx="0" cy="0"/>
+          <a:chOff x="0" y="0"/>
+          <a:chExt cx="0" cy="0"/>
+        </a:xfrm>
+      </p:grpSpPr>
+      <p:pic>
+        <p:nvPicPr>
+          <p:cNvPr id="3" name="selectMe1"/>
+          <p:cNvPicPr>
+            <a:picLocks noChangeAspect="1"/>
+          </p:cNvPicPr>
+          <p:nvPr/>
+        </p:nvPicPr>
+        <p:blipFill rotWithShape="1">
+          <a:blip r:embed="rId2">
+            <a:extLst>
+              <a:ext uri="{28A0092B-C50C-407E-A947-70E740481C1C}">
+                <a14:useLocalDpi xmlns:a14="http://schemas.microsoft.com/office/drawing/2010/main" val="0"/>
+              </a:ext>
+            </a:extLst>
+          </a:blip>
+          <a:srcRect l="10000" t="9966" r="6667" b="10306"/>
+          <a:stretch/>
+        </p:blipFill>
+        <p:spPr>
+          <a:xfrm>
+            <a:off x="4114800" y="3352800"/>
+            <a:ext cx="3810000" cy="2438400"/>
+          </a:xfrm>
+          <a:prstGeom prst="rect">
+            <a:avLst/>
+          </a:prstGeom>
+        </p:spPr>
+      </p:pic>
+      <p:sp>
+        <p:nvSpPr>
+          <p:cNvPr id="2" name="selectMe2"/>
+          <p:cNvSpPr/>
+          <p:nvPr/>
+        </p:nvSpPr>
+        <p:spPr>
+          <a:xfrm>
+            <a:off x="1143000" y="1371600"/>
+            <a:ext cx="1905000" cy="1524000"/>
+          </a:xfrm>
+          <a:prstGeom prst="rect">
+            <a:avLst/>
+          </a:prstGeom>
+        </p:spPr>
+        <p:style>
+          <a:lnRef idx="2">
+            <a:schemeClr val="accent1">
+              <a:shade val="50000"/>
+            </a:schemeClr>
+          </a:lnRef>
+          <a:fillRef idx="1">
+            <a:schemeClr val="accent1"/>
+          </a:fillRef>
+          <a:effectRef idx="0">
+            <a:schemeClr val="accent1"/>
+          </a:effectRef>
+          <a:fontRef idx="minor">
+            <a:schemeClr val="lt1"/>
+          </a:fontRef>
+        </p:style>
+        <p:txBody>
+          <a:bodyPr rtlCol="0" anchor="ctr"/>
+          <a:lstStyle/>
+          <a:p>
+            <a:pPr algn="ctr"/>
+            <a:endParaRPr lang="en-US"/>
+          </a:p>
+        </p:txBody>
+      </p:sp>
+    </p:spTree>
+    <p:extLst>
+      <p:ext uri="{BB962C8B-B14F-4D97-AF65-F5344CB8AC3E}">
+        <p14:creationId xmlns:p14="http://schemas.microsoft.com/office/powerpoint/2010/main" val="2203653812"/>
+      </p:ext>
+    </p:extLst>
+  </p:cSld>
+  <p:clrMapOvr>
+    <a:masterClrMapping/>
+  </p:clrMapOvr>
+</p:sld>
+</file>
+
+<file path=ppt/slides/slide34.xml><?xml version="1.0" encoding="utf-8"?>
+<p:sld xmlns:a="http://schemas.openxmlformats.org/drawingml/2006/main" xmlns:r="http://schemas.openxmlformats.org/officeDocument/2006/relationships" xmlns:p="http://schemas.openxmlformats.org/presentationml/2006/main">
+  <p:cSld>
+    <p:bg>
+      <p:bgPr>
+        <a:solidFill>
+          <a:schemeClr val="bg1"/>
+        </a:solidFill>
+        <a:effectLst/>
+      </p:bgPr>
+    </p:bg>
+    <p:spTree>
+      <p:nvGrpSpPr>
+        <p:cNvPr id="1" name=""/>
+        <p:cNvGrpSpPr/>
+        <p:nvPr/>
+      </p:nvGrpSpPr>
+      <p:grpSpPr>
+        <a:xfrm>
+          <a:off x="0" y="0"/>
+          <a:ext cx="0" cy="0"/>
+          <a:chOff x="0" y="0"/>
+          <a:chExt cx="0" cy="0"/>
+        </a:xfrm>
+      </p:grpSpPr>
+      <p:sp>
+        <p:nvSpPr>
+          <p:cNvPr id="5" name="text"/>
+          <p:cNvSpPr txBox="1"/>
+          <p:nvPr/>
+        </p:nvSpPr>
+        <p:spPr>
+          <a:xfrm>
+            <a:off x="8101022" y="0"/>
+            <a:ext cx="1042978" cy="369332"/>
+          </a:xfrm>
+          <a:prstGeom prst="rect">
+            <a:avLst/>
+          </a:prstGeom>
+          <a:noFill/>
+        </p:spPr>
+        <p:txBody>
+          <a:bodyPr wrap="none" rtlCol="0">
+            <a:spAutoFit/>
+          </a:bodyPr>
+          <a:lstStyle/>
+          <a:p>
+            <a:r>
+              <a:rPr lang="en-SG" dirty="0"/>
+              <a:t>Expected</a:t>
+            </a:r>
+          </a:p>
+        </p:txBody>
+      </p:sp>
+      <p:pic>
+        <p:nvPicPr>
+          <p:cNvPr id="6" name="selectMe1"/>
+          <p:cNvPicPr>
+            <a:picLocks noChangeAspect="1"/>
+          </p:cNvPicPr>
+          <p:nvPr/>
+        </p:nvPicPr>
+        <p:blipFill rotWithShape="1">
+          <a:blip r:embed="rId2">
+            <a:extLst>
+              <a:ext uri="{28A0092B-C50C-407E-A947-70E740481C1C}">
+                <a14:useLocalDpi xmlns:a14="http://schemas.microsoft.com/office/drawing/2010/main" val="0"/>
+              </a:ext>
+            </a:extLst>
+          </a:blip>
+          <a:srcRect l="30833" t="24915" r="27500" b="25255"/>
+          <a:stretch/>
+        </p:blipFill>
+        <p:spPr>
+          <a:xfrm>
+            <a:off x="5067299" y="3809999"/>
+            <a:ext cx="1905005" cy="1524001"/>
+          </a:xfrm>
+          <a:prstGeom prst="rect">
+            <a:avLst/>
+          </a:prstGeom>
+        </p:spPr>
+      </p:pic>
+      <p:sp>
+        <p:nvSpPr>
+          <p:cNvPr id="7" name="selectMe2"/>
+          <p:cNvSpPr/>
+          <p:nvPr/>
+        </p:nvSpPr>
+        <p:spPr>
+          <a:xfrm>
+            <a:off x="1143000" y="1371600"/>
+            <a:ext cx="1905000" cy="1524000"/>
+          </a:xfrm>
+          <a:prstGeom prst="rect">
+            <a:avLst/>
+          </a:prstGeom>
+        </p:spPr>
+        <p:style>
+          <a:lnRef idx="2">
+            <a:schemeClr val="accent1">
+              <a:shade val="50000"/>
+            </a:schemeClr>
+          </a:lnRef>
+          <a:fillRef idx="1">
+            <a:schemeClr val="accent1"/>
+          </a:fillRef>
+          <a:effectRef idx="0">
+            <a:schemeClr val="accent1"/>
+          </a:effectRef>
+          <a:fontRef idx="minor">
+            <a:schemeClr val="lt1"/>
+          </a:fontRef>
+        </p:style>
+        <p:txBody>
+          <a:bodyPr rtlCol="0" anchor="ctr"/>
+          <a:lstStyle/>
+          <a:p>
+            <a:pPr algn="ctr"/>
+            <a:endParaRPr lang="en-US"/>
+          </a:p>
+        </p:txBody>
+      </p:sp>
+    </p:spTree>
+    <p:extLst>
+      <p:ext uri="{BB962C8B-B14F-4D97-AF65-F5344CB8AC3E}">
+        <p14:creationId xmlns:p14="http://schemas.microsoft.com/office/powerpoint/2010/main" val="26698444"/>
+      </p:ext>
+    </p:extLst>
+  </p:cSld>
+  <p:clrMapOvr>
+    <a:masterClrMapping/>
+  </p:clrMapOvr>
+</p:sld>
+</file>
+
+<file path=ppt/slides/slide35.xml><?xml version="1.0" encoding="utf-8"?>
 <p:sld xmlns:a="http://schemas.openxmlformats.org/drawingml/2006/main" xmlns:r="http://schemas.openxmlformats.org/officeDocument/2006/relationships" xmlns:p="http://schemas.openxmlformats.org/presentationml/2006/main" show="0">
   <p:cSld>
     <p:spTree>
@@ -12249,7 +12574,7 @@
           <a:p>
             <a:r>
               <a:rPr lang="en-US" dirty="0"/>
-              <a:t>Auto Crop:: Two edges cropped</a:t>
+              <a:t>Crop To Same:: Two edges cropped</a:t>
             </a:r>
             <a:endParaRPr lang="en-SG" dirty="0"/>
           </a:p>
@@ -12545,7 +12870,7 @@
           <a:p>
             <a:r>
               <a:rPr lang="en-US" dirty="0"/>
-              <a:t>Auto Crop:: Four edges cropped</a:t>
+              <a:t>Crop To Same:: Four edges cropped</a:t>
             </a:r>
             <a:endParaRPr lang="en-SG" dirty="0"/>
           </a:p>

</xml_diff>

<commit_message>
Crop to same dimensions: support normal shapes for reference object #1383  (#1388)
* Allow shape as reference object for Crop To Same Dimension

* Refactor Crop To Same branch conditions
</commit_message>
<xml_diff>
--- a/doc/test/CropToSame.pptx
+++ b/doc/test/CropToSame.pptx
@@ -7,7 +7,7 @@
     <p:sldMasterId id="2147483672" r:id="rId3"/>
   </p:sldMasterIdLst>
   <p:notesMasterIdLst>
-    <p:notesMasterId r:id="rId36"/>
+    <p:notesMasterId r:id="rId39"/>
   </p:notesMasterIdLst>
   <p:sldIdLst>
     <p:sldId id="287" r:id="rId4"/>
@@ -41,7 +41,10 @@
     <p:sldId id="293" r:id="rId32"/>
     <p:sldId id="321" r:id="rId33"/>
     <p:sldId id="362" r:id="rId34"/>
-    <p:sldId id="318" r:id="rId35"/>
+    <p:sldId id="373" r:id="rId35"/>
+    <p:sldId id="374" r:id="rId36"/>
+    <p:sldId id="375" r:id="rId37"/>
+    <p:sldId id="318" r:id="rId38"/>
   </p:sldIdLst>
   <p:sldSz cx="9144000" cy="6858000" type="screen4x3"/>
   <p:notesSz cx="6858000" cy="9144000"/>
@@ -180,6 +183,9 @@
             <p14:sldId id="293"/>
             <p14:sldId id="321"/>
             <p14:sldId id="362"/>
+            <p14:sldId id="373"/>
+            <p14:sldId id="374"/>
+            <p14:sldId id="375"/>
             <p14:sldId id="318"/>
           </p14:sldIdLst>
         </p14:section>
@@ -201,6 +207,10 @@
     </p:ext>
   </p:extLst>
 </p:presentation>
+</file>
+
+<file path=ppt/revisionInfo.xml><?xml version="1.0" encoding="utf-8"?>
+<p1510:revInfo xmlns:a="http://schemas.openxmlformats.org/drawingml/2006/main" xmlns:r="http://schemas.openxmlformats.org/officeDocument/2006/relationships" xmlns:p1510="http://schemas.microsoft.com/office/powerpoint/2015/10/main"/>
 </file>
 
 <file path=ppt/notesMasters/notesMaster1.xml><?xml version="1.0" encoding="utf-8"?>
@@ -285,7 +295,7 @@
           <a:p>
             <a:fld id="{26004F41-C1A1-4B0D-9EEE-5E3F0E5BC108}" type="datetimeFigureOut">
               <a:rPr lang="en-SG" smtClean="0"/>
-              <a:t>3/31/2017</a:t>
+              <a:t>29/5/2017</a:t>
             </a:fld>
             <a:endParaRPr lang="en-SG"/>
           </a:p>
@@ -732,7 +742,7 @@
           <a:p>
             <a:fld id="{699DC775-C286-4358-8C92-D7E584E969B3}" type="datetimeFigureOut">
               <a:rPr lang="en-US" smtClean="0"/>
-              <a:t>3/31/2017</a:t>
+              <a:t>5/29/2017</a:t>
             </a:fld>
             <a:endParaRPr lang="en-US"/>
           </a:p>
@@ -900,7 +910,7 @@
           <a:p>
             <a:fld id="{699DC775-C286-4358-8C92-D7E584E969B3}" type="datetimeFigureOut">
               <a:rPr lang="en-US" smtClean="0"/>
-              <a:t>3/31/2017</a:t>
+              <a:t>5/29/2017</a:t>
             </a:fld>
             <a:endParaRPr lang="en-US"/>
           </a:p>
@@ -1078,7 +1088,7 @@
           <a:p>
             <a:fld id="{699DC775-C286-4358-8C92-D7E584E969B3}" type="datetimeFigureOut">
               <a:rPr lang="en-US" smtClean="0"/>
-              <a:t>3/31/2017</a:t>
+              <a:t>5/29/2017</a:t>
             </a:fld>
             <a:endParaRPr lang="en-US"/>
           </a:p>
@@ -1318,7 +1328,7 @@
           <a:p>
             <a:fld id="{699DC775-C286-4358-8C92-D7E584E969B3}" type="datetimeFigureOut">
               <a:rPr lang="en-US" smtClean="0"/>
-              <a:t>3/31/2017</a:t>
+              <a:t>5/29/2017</a:t>
             </a:fld>
             <a:endParaRPr lang="en-US"/>
           </a:p>
@@ -1486,7 +1496,7 @@
           <a:p>
             <a:fld id="{699DC775-C286-4358-8C92-D7E584E969B3}" type="datetimeFigureOut">
               <a:rPr lang="en-US" smtClean="0"/>
-              <a:t>3/31/2017</a:t>
+              <a:t>5/29/2017</a:t>
             </a:fld>
             <a:endParaRPr lang="en-US"/>
           </a:p>
@@ -1731,7 +1741,7 @@
           <a:p>
             <a:fld id="{699DC775-C286-4358-8C92-D7E584E969B3}" type="datetimeFigureOut">
               <a:rPr lang="en-US" smtClean="0"/>
-              <a:t>3/31/2017</a:t>
+              <a:t>5/29/2017</a:t>
             </a:fld>
             <a:endParaRPr lang="en-US"/>
           </a:p>
@@ -2016,7 +2026,7 @@
           <a:p>
             <a:fld id="{699DC775-C286-4358-8C92-D7E584E969B3}" type="datetimeFigureOut">
               <a:rPr lang="en-US" smtClean="0"/>
-              <a:t>3/31/2017</a:t>
+              <a:t>5/29/2017</a:t>
             </a:fld>
             <a:endParaRPr lang="en-US"/>
           </a:p>
@@ -2435,7 +2445,7 @@
           <a:p>
             <a:fld id="{699DC775-C286-4358-8C92-D7E584E969B3}" type="datetimeFigureOut">
               <a:rPr lang="en-US" smtClean="0"/>
-              <a:t>3/31/2017</a:t>
+              <a:t>5/29/2017</a:t>
             </a:fld>
             <a:endParaRPr lang="en-US"/>
           </a:p>
@@ -2552,7 +2562,7 @@
           <a:p>
             <a:fld id="{699DC775-C286-4358-8C92-D7E584E969B3}" type="datetimeFigureOut">
               <a:rPr lang="en-US" smtClean="0"/>
-              <a:t>3/31/2017</a:t>
+              <a:t>5/29/2017</a:t>
             </a:fld>
             <a:endParaRPr lang="en-US"/>
           </a:p>
@@ -2647,7 +2657,7 @@
           <a:p>
             <a:fld id="{699DC775-C286-4358-8C92-D7E584E969B3}" type="datetimeFigureOut">
               <a:rPr lang="en-US" smtClean="0"/>
-              <a:t>3/31/2017</a:t>
+              <a:t>5/29/2017</a:t>
             </a:fld>
             <a:endParaRPr lang="en-US"/>
           </a:p>
@@ -2922,7 +2932,7 @@
           <a:p>
             <a:fld id="{699DC775-C286-4358-8C92-D7E584E969B3}" type="datetimeFigureOut">
               <a:rPr lang="en-US" smtClean="0"/>
-              <a:t>3/31/2017</a:t>
+              <a:t>5/29/2017</a:t>
             </a:fld>
             <a:endParaRPr lang="en-US"/>
           </a:p>
@@ -3090,7 +3100,7 @@
           <a:p>
             <a:fld id="{699DC775-C286-4358-8C92-D7E584E969B3}" type="datetimeFigureOut">
               <a:rPr lang="en-US" smtClean="0"/>
-              <a:t>3/31/2017</a:t>
+              <a:t>5/29/2017</a:t>
             </a:fld>
             <a:endParaRPr lang="en-US"/>
           </a:p>
@@ -3342,7 +3352,7 @@
           <a:p>
             <a:fld id="{699DC775-C286-4358-8C92-D7E584E969B3}" type="datetimeFigureOut">
               <a:rPr lang="en-US" smtClean="0"/>
-              <a:t>3/31/2017</a:t>
+              <a:t>5/29/2017</a:t>
             </a:fld>
             <a:endParaRPr lang="en-US"/>
           </a:p>
@@ -3510,7 +3520,7 @@
           <a:p>
             <a:fld id="{699DC775-C286-4358-8C92-D7E584E969B3}" type="datetimeFigureOut">
               <a:rPr lang="en-US" smtClean="0"/>
-              <a:t>3/31/2017</a:t>
+              <a:t>5/29/2017</a:t>
             </a:fld>
             <a:endParaRPr lang="en-US"/>
           </a:p>
@@ -3688,7 +3698,7 @@
           <a:p>
             <a:fld id="{699DC775-C286-4358-8C92-D7E584E969B3}" type="datetimeFigureOut">
               <a:rPr lang="en-US" smtClean="0"/>
-              <a:t>3/31/2017</a:t>
+              <a:t>5/29/2017</a:t>
             </a:fld>
             <a:endParaRPr lang="en-US"/>
           </a:p>
@@ -3936,7 +3946,7 @@
           <a:p>
             <a:fld id="{699DC775-C286-4358-8C92-D7E584E969B3}" type="datetimeFigureOut">
               <a:rPr lang="en-US" smtClean="0"/>
-              <a:t>3/31/2017</a:t>
+              <a:t>5/29/2017</a:t>
             </a:fld>
             <a:endParaRPr lang="en-US"/>
           </a:p>
@@ -4112,7 +4122,7 @@
           <a:p>
             <a:fld id="{699DC775-C286-4358-8C92-D7E584E969B3}" type="datetimeFigureOut">
               <a:rPr lang="en-US" smtClean="0"/>
-              <a:t>3/31/2017</a:t>
+              <a:t>5/29/2017</a:t>
             </a:fld>
             <a:endParaRPr lang="en-US"/>
           </a:p>
@@ -4365,7 +4375,7 @@
           <a:p>
             <a:fld id="{699DC775-C286-4358-8C92-D7E584E969B3}" type="datetimeFigureOut">
               <a:rPr lang="en-US" smtClean="0"/>
-              <a:t>3/31/2017</a:t>
+              <a:t>5/29/2017</a:t>
             </a:fld>
             <a:endParaRPr lang="en-US"/>
           </a:p>
@@ -4658,7 +4668,7 @@
           <a:p>
             <a:fld id="{699DC775-C286-4358-8C92-D7E584E969B3}" type="datetimeFigureOut">
               <a:rPr lang="en-US" smtClean="0"/>
-              <a:t>3/31/2017</a:t>
+              <a:t>5/29/2017</a:t>
             </a:fld>
             <a:endParaRPr lang="en-US"/>
           </a:p>
@@ -5085,7 +5095,7 @@
           <a:p>
             <a:fld id="{699DC775-C286-4358-8C92-D7E584E969B3}" type="datetimeFigureOut">
               <a:rPr lang="en-US" smtClean="0"/>
-              <a:t>3/31/2017</a:t>
+              <a:t>5/29/2017</a:t>
             </a:fld>
             <a:endParaRPr lang="en-US"/>
           </a:p>
@@ -5210,7 +5220,7 @@
           <a:p>
             <a:fld id="{699DC775-C286-4358-8C92-D7E584E969B3}" type="datetimeFigureOut">
               <a:rPr lang="en-US" smtClean="0"/>
-              <a:t>3/31/2017</a:t>
+              <a:t>5/29/2017</a:t>
             </a:fld>
             <a:endParaRPr lang="en-US"/>
           </a:p>
@@ -5313,7 +5323,7 @@
           <a:p>
             <a:fld id="{699DC775-C286-4358-8C92-D7E584E969B3}" type="datetimeFigureOut">
               <a:rPr lang="en-US" smtClean="0"/>
-              <a:t>3/31/2017</a:t>
+              <a:t>5/29/2017</a:t>
             </a:fld>
             <a:endParaRPr lang="en-US"/>
           </a:p>
@@ -5558,7 +5568,7 @@
           <a:p>
             <a:fld id="{699DC775-C286-4358-8C92-D7E584E969B3}" type="datetimeFigureOut">
               <a:rPr lang="en-US" smtClean="0"/>
-              <a:t>3/31/2017</a:t>
+              <a:t>5/29/2017</a:t>
             </a:fld>
             <a:endParaRPr lang="en-US"/>
           </a:p>
@@ -5841,7 +5851,7 @@
           <a:p>
             <a:fld id="{699DC775-C286-4358-8C92-D7E584E969B3}" type="datetimeFigureOut">
               <a:rPr lang="en-US" smtClean="0"/>
-              <a:t>3/31/2017</a:t>
+              <a:t>5/29/2017</a:t>
             </a:fld>
             <a:endParaRPr lang="en-US"/>
           </a:p>
@@ -6101,7 +6111,7 @@
           <a:p>
             <a:fld id="{699DC775-C286-4358-8C92-D7E584E969B3}" type="datetimeFigureOut">
               <a:rPr lang="en-US" smtClean="0"/>
-              <a:t>3/31/2017</a:t>
+              <a:t>5/29/2017</a:t>
             </a:fld>
             <a:endParaRPr lang="en-US"/>
           </a:p>
@@ -6277,7 +6287,7 @@
           <a:p>
             <a:fld id="{699DC775-C286-4358-8C92-D7E584E969B3}" type="datetimeFigureOut">
               <a:rPr lang="en-US" smtClean="0"/>
-              <a:t>3/31/2017</a:t>
+              <a:t>5/29/2017</a:t>
             </a:fld>
             <a:endParaRPr lang="en-US"/>
           </a:p>
@@ -6463,7 +6473,7 @@
           <a:p>
             <a:fld id="{699DC775-C286-4358-8C92-D7E584E969B3}" type="datetimeFigureOut">
               <a:rPr lang="en-US" smtClean="0"/>
-              <a:t>3/31/2017</a:t>
+              <a:t>5/29/2017</a:t>
             </a:fld>
             <a:endParaRPr lang="en-US"/>
           </a:p>
@@ -6748,7 +6758,7 @@
           <a:p>
             <a:fld id="{699DC775-C286-4358-8C92-D7E584E969B3}" type="datetimeFigureOut">
               <a:rPr lang="en-US" smtClean="0"/>
-              <a:t>3/31/2017</a:t>
+              <a:t>5/29/2017</a:t>
             </a:fld>
             <a:endParaRPr lang="en-US"/>
           </a:p>
@@ -7167,7 +7177,7 @@
           <a:p>
             <a:fld id="{699DC775-C286-4358-8C92-D7E584E969B3}" type="datetimeFigureOut">
               <a:rPr lang="en-US" smtClean="0"/>
-              <a:t>3/31/2017</a:t>
+              <a:t>5/29/2017</a:t>
             </a:fld>
             <a:endParaRPr lang="en-US"/>
           </a:p>
@@ -7284,7 +7294,7 @@
           <a:p>
             <a:fld id="{699DC775-C286-4358-8C92-D7E584E969B3}" type="datetimeFigureOut">
               <a:rPr lang="en-US" smtClean="0"/>
-              <a:t>3/31/2017</a:t>
+              <a:t>5/29/2017</a:t>
             </a:fld>
             <a:endParaRPr lang="en-US"/>
           </a:p>
@@ -7379,7 +7389,7 @@
           <a:p>
             <a:fld id="{699DC775-C286-4358-8C92-D7E584E969B3}" type="datetimeFigureOut">
               <a:rPr lang="en-US" smtClean="0"/>
-              <a:t>3/31/2017</a:t>
+              <a:t>5/29/2017</a:t>
             </a:fld>
             <a:endParaRPr lang="en-US"/>
           </a:p>
@@ -7654,7 +7664,7 @@
           <a:p>
             <a:fld id="{699DC775-C286-4358-8C92-D7E584E969B3}" type="datetimeFigureOut">
               <a:rPr lang="en-US" smtClean="0"/>
-              <a:t>3/31/2017</a:t>
+              <a:t>5/29/2017</a:t>
             </a:fld>
             <a:endParaRPr lang="en-US"/>
           </a:p>
@@ -7906,7 +7916,7 @@
           <a:p>
             <a:fld id="{699DC775-C286-4358-8C92-D7E584E969B3}" type="datetimeFigureOut">
               <a:rPr lang="en-US" smtClean="0"/>
-              <a:t>3/31/2017</a:t>
+              <a:t>5/29/2017</a:t>
             </a:fld>
             <a:endParaRPr lang="en-US"/>
           </a:p>
@@ -8117,7 +8127,7 @@
           <a:p>
             <a:fld id="{699DC775-C286-4358-8C92-D7E584E969B3}" type="datetimeFigureOut">
               <a:rPr lang="en-US" smtClean="0"/>
-              <a:t>3/31/2017</a:t>
+              <a:t>5/29/2017</a:t>
             </a:fld>
             <a:endParaRPr lang="en-US"/>
           </a:p>
@@ -8630,7 +8640,7 @@
           <a:p>
             <a:fld id="{699DC775-C286-4358-8C92-D7E584E969B3}" type="datetimeFigureOut">
               <a:rPr lang="en-US" smtClean="0"/>
-              <a:t>3/31/2017</a:t>
+              <a:t>5/29/2017</a:t>
             </a:fld>
             <a:endParaRPr lang="en-US"/>
           </a:p>
@@ -9141,7 +9151,7 @@
           <a:p>
             <a:fld id="{699DC775-C286-4358-8C92-D7E584E969B3}" type="datetimeFigureOut">
               <a:rPr lang="en-US" smtClean="0"/>
-              <a:t>3/31/2017</a:t>
+              <a:t>5/29/2017</a:t>
             </a:fld>
             <a:endParaRPr lang="en-US"/>
           </a:p>
@@ -9901,7 +9911,7 @@
           <a:p>
             <a:r>
               <a:rPr lang="en-US" dirty="0"/>
-              <a:t>Auto Crop:: Smaller reference image</a:t>
+              <a:t>Crop To Same:: Smaller reference image</a:t>
             </a:r>
             <a:endParaRPr lang="en-SG" dirty="0"/>
           </a:p>
@@ -10199,7 +10209,7 @@
           <a:p>
             <a:r>
               <a:rPr lang="en-US" dirty="0"/>
-              <a:t>Auto Crop:: Wider but shorter reference image</a:t>
+              <a:t>Crop To Same:: Wider but shorter reference image</a:t>
             </a:r>
             <a:endParaRPr lang="en-SG" dirty="0"/>
           </a:p>
@@ -10497,7 +10507,7 @@
           <a:p>
             <a:r>
               <a:rPr lang="en-US" dirty="0"/>
-              <a:t>Auto Crop:: Cropped image</a:t>
+              <a:t>Crop To Same:: Cropped image</a:t>
             </a:r>
             <a:br>
               <a:rPr lang="en-US" dirty="0"/>
@@ -10963,7 +10973,7 @@
           <a:p>
             <a:r>
               <a:rPr lang="en-US" dirty="0"/>
-              <a:t>Auto Crop:: Custom Anchor</a:t>
+              <a:t>Crop To Same:: Custom Anchor</a:t>
             </a:r>
             <a:endParaRPr lang="en-SG" dirty="0"/>
           </a:p>
@@ -11261,7 +11271,7 @@
           <a:p>
             <a:r>
               <a:rPr lang="en-US" dirty="0"/>
-              <a:t>Auto Crop:: non-picture selected</a:t>
+              <a:t>Crop To Same:: non-picture selected</a:t>
             </a:r>
             <a:endParaRPr lang="en-SG" dirty="0"/>
           </a:p>
@@ -11446,7 +11456,7 @@
           <a:p>
             <a:r>
               <a:rPr lang="en-US" dirty="0"/>
-              <a:t>Auto Crop:: nothing selected</a:t>
+              <a:t>Crop To Same:: nothing selected</a:t>
             </a:r>
             <a:endParaRPr lang="en-SG" dirty="0"/>
           </a:p>
@@ -11554,7 +11564,7 @@
           <a:p>
             <a:r>
               <a:rPr lang="en-US" dirty="0"/>
-              <a:t>Auto Crop:: Same picture</a:t>
+              <a:t>Crop To Same:: Same picture</a:t>
             </a:r>
             <a:endParaRPr lang="en-SG" dirty="0"/>
           </a:p>
@@ -11724,7 +11734,7 @@
           <a:p>
             <a:r>
               <a:rPr lang="en-US" dirty="0"/>
-              <a:t>Auto Crop:: One edge cropped</a:t>
+              <a:t>Crop To Same:: One edge cropped</a:t>
             </a:r>
             <a:endParaRPr lang="en-SG" dirty="0"/>
           </a:p>
@@ -11777,7 +11787,7 @@
           <a:p>
             <a:r>
               <a:rPr lang="en-US" dirty="0"/>
-              <a:t>Auto Crop:: Larger reference image</a:t>
+              <a:t>Crop To Same:: Larger reference image</a:t>
             </a:r>
             <a:endParaRPr lang="en-SG" dirty="0"/>
           </a:p>
@@ -11914,6 +11924,321 @@
 </file>
 
 <file path=ppt/slides/slide32.xml><?xml version="1.0" encoding="utf-8"?>
+<p:sld xmlns:a="http://schemas.openxmlformats.org/drawingml/2006/main" xmlns:r="http://schemas.openxmlformats.org/officeDocument/2006/relationships" xmlns:p="http://schemas.openxmlformats.org/presentationml/2006/main">
+  <p:cSld>
+    <p:spTree>
+      <p:nvGrpSpPr>
+        <p:cNvPr id="1" name=""/>
+        <p:cNvGrpSpPr/>
+        <p:nvPr/>
+      </p:nvGrpSpPr>
+      <p:grpSpPr>
+        <a:xfrm>
+          <a:off x="0" y="0"/>
+          <a:ext cx="0" cy="0"/>
+          <a:chOff x="0" y="0"/>
+          <a:chExt cx="0" cy="0"/>
+        </a:xfrm>
+      </p:grpSpPr>
+      <p:sp>
+        <p:nvSpPr>
+          <p:cNvPr id="2" name="Title 1"/>
+          <p:cNvSpPr>
+            <a:spLocks noGrp="1"/>
+          </p:cNvSpPr>
+          <p:nvPr>
+            <p:ph type="title"/>
+          </p:nvPr>
+        </p:nvSpPr>
+        <p:spPr/>
+        <p:txBody>
+          <a:bodyPr/>
+          <a:lstStyle/>
+          <a:p>
+            <a:r>
+              <a:rPr lang="en-US" dirty="0"/>
+              <a:t>Crop To Same:: Shape as reference object</a:t>
+            </a:r>
+            <a:endParaRPr lang="en-SG" dirty="0"/>
+          </a:p>
+        </p:txBody>
+      </p:sp>
+      <p:sp>
+        <p:nvSpPr>
+          <p:cNvPr id="3" name="Content Placeholder 2"/>
+          <p:cNvSpPr>
+            <a:spLocks noGrp="1"/>
+          </p:cNvSpPr>
+          <p:nvPr>
+            <p:ph idx="1"/>
+          </p:nvPr>
+        </p:nvSpPr>
+        <p:spPr/>
+        <p:txBody>
+          <a:bodyPr/>
+          <a:lstStyle/>
+          <a:p>
+            <a:endParaRPr lang="en-SG" dirty="0"/>
+          </a:p>
+        </p:txBody>
+      </p:sp>
+    </p:spTree>
+    <p:extLst>
+      <p:ext uri="{BB962C8B-B14F-4D97-AF65-F5344CB8AC3E}">
+        <p14:creationId xmlns:p14="http://schemas.microsoft.com/office/powerpoint/2010/main" val="814270024"/>
+      </p:ext>
+    </p:extLst>
+  </p:cSld>
+  <p:clrMapOvr>
+    <a:masterClrMapping/>
+  </p:clrMapOvr>
+</p:sld>
+</file>
+
+<file path=ppt/slides/slide33.xml><?xml version="1.0" encoding="utf-8"?>
+<p:sld xmlns:a="http://schemas.openxmlformats.org/drawingml/2006/main" xmlns:r="http://schemas.openxmlformats.org/officeDocument/2006/relationships" xmlns:p="http://schemas.openxmlformats.org/presentationml/2006/main">
+  <p:cSld>
+    <p:bg>
+      <p:bgPr>
+        <a:solidFill>
+          <a:schemeClr val="bg1"/>
+        </a:solidFill>
+        <a:effectLst/>
+      </p:bgPr>
+    </p:bg>
+    <p:spTree>
+      <p:nvGrpSpPr>
+        <p:cNvPr id="1" name=""/>
+        <p:cNvGrpSpPr/>
+        <p:nvPr/>
+      </p:nvGrpSpPr>
+      <p:grpSpPr>
+        <a:xfrm>
+          <a:off x="0" y="0"/>
+          <a:ext cx="0" cy="0"/>
+          <a:chOff x="0" y="0"/>
+          <a:chExt cx="0" cy="0"/>
+        </a:xfrm>
+      </p:grpSpPr>
+      <p:pic>
+        <p:nvPicPr>
+          <p:cNvPr id="3" name="selectMe1"/>
+          <p:cNvPicPr>
+            <a:picLocks noChangeAspect="1"/>
+          </p:cNvPicPr>
+          <p:nvPr/>
+        </p:nvPicPr>
+        <p:blipFill rotWithShape="1">
+          <a:blip r:embed="rId2">
+            <a:extLst>
+              <a:ext uri="{28A0092B-C50C-407E-A947-70E740481C1C}">
+                <a14:useLocalDpi xmlns:a14="http://schemas.microsoft.com/office/drawing/2010/main" val="0"/>
+              </a:ext>
+            </a:extLst>
+          </a:blip>
+          <a:srcRect l="10000" t="9966" r="6667" b="10306"/>
+          <a:stretch/>
+        </p:blipFill>
+        <p:spPr>
+          <a:xfrm>
+            <a:off x="4114800" y="3352800"/>
+            <a:ext cx="3810000" cy="2438400"/>
+          </a:xfrm>
+          <a:prstGeom prst="rect">
+            <a:avLst/>
+          </a:prstGeom>
+        </p:spPr>
+      </p:pic>
+      <p:sp>
+        <p:nvSpPr>
+          <p:cNvPr id="2" name="selectMe2"/>
+          <p:cNvSpPr/>
+          <p:nvPr/>
+        </p:nvSpPr>
+        <p:spPr>
+          <a:xfrm>
+            <a:off x="1143000" y="1371600"/>
+            <a:ext cx="1905000" cy="1524000"/>
+          </a:xfrm>
+          <a:prstGeom prst="rect">
+            <a:avLst/>
+          </a:prstGeom>
+        </p:spPr>
+        <p:style>
+          <a:lnRef idx="2">
+            <a:schemeClr val="accent1">
+              <a:shade val="50000"/>
+            </a:schemeClr>
+          </a:lnRef>
+          <a:fillRef idx="1">
+            <a:schemeClr val="accent1"/>
+          </a:fillRef>
+          <a:effectRef idx="0">
+            <a:schemeClr val="accent1"/>
+          </a:effectRef>
+          <a:fontRef idx="minor">
+            <a:schemeClr val="lt1"/>
+          </a:fontRef>
+        </p:style>
+        <p:txBody>
+          <a:bodyPr rtlCol="0" anchor="ctr"/>
+          <a:lstStyle/>
+          <a:p>
+            <a:pPr algn="ctr"/>
+            <a:endParaRPr lang="en-US"/>
+          </a:p>
+        </p:txBody>
+      </p:sp>
+    </p:spTree>
+    <p:extLst>
+      <p:ext uri="{BB962C8B-B14F-4D97-AF65-F5344CB8AC3E}">
+        <p14:creationId xmlns:p14="http://schemas.microsoft.com/office/powerpoint/2010/main" val="2203653812"/>
+      </p:ext>
+    </p:extLst>
+  </p:cSld>
+  <p:clrMapOvr>
+    <a:masterClrMapping/>
+  </p:clrMapOvr>
+</p:sld>
+</file>
+
+<file path=ppt/slides/slide34.xml><?xml version="1.0" encoding="utf-8"?>
+<p:sld xmlns:a="http://schemas.openxmlformats.org/drawingml/2006/main" xmlns:r="http://schemas.openxmlformats.org/officeDocument/2006/relationships" xmlns:p="http://schemas.openxmlformats.org/presentationml/2006/main">
+  <p:cSld>
+    <p:bg>
+      <p:bgPr>
+        <a:solidFill>
+          <a:schemeClr val="bg1"/>
+        </a:solidFill>
+        <a:effectLst/>
+      </p:bgPr>
+    </p:bg>
+    <p:spTree>
+      <p:nvGrpSpPr>
+        <p:cNvPr id="1" name=""/>
+        <p:cNvGrpSpPr/>
+        <p:nvPr/>
+      </p:nvGrpSpPr>
+      <p:grpSpPr>
+        <a:xfrm>
+          <a:off x="0" y="0"/>
+          <a:ext cx="0" cy="0"/>
+          <a:chOff x="0" y="0"/>
+          <a:chExt cx="0" cy="0"/>
+        </a:xfrm>
+      </p:grpSpPr>
+      <p:sp>
+        <p:nvSpPr>
+          <p:cNvPr id="5" name="text"/>
+          <p:cNvSpPr txBox="1"/>
+          <p:nvPr/>
+        </p:nvSpPr>
+        <p:spPr>
+          <a:xfrm>
+            <a:off x="8101022" y="0"/>
+            <a:ext cx="1042978" cy="369332"/>
+          </a:xfrm>
+          <a:prstGeom prst="rect">
+            <a:avLst/>
+          </a:prstGeom>
+          <a:noFill/>
+        </p:spPr>
+        <p:txBody>
+          <a:bodyPr wrap="none" rtlCol="0">
+            <a:spAutoFit/>
+          </a:bodyPr>
+          <a:lstStyle/>
+          <a:p>
+            <a:r>
+              <a:rPr lang="en-SG" dirty="0"/>
+              <a:t>Expected</a:t>
+            </a:r>
+          </a:p>
+        </p:txBody>
+      </p:sp>
+      <p:pic>
+        <p:nvPicPr>
+          <p:cNvPr id="6" name="selectMe1"/>
+          <p:cNvPicPr>
+            <a:picLocks noChangeAspect="1"/>
+          </p:cNvPicPr>
+          <p:nvPr/>
+        </p:nvPicPr>
+        <p:blipFill rotWithShape="1">
+          <a:blip r:embed="rId2">
+            <a:extLst>
+              <a:ext uri="{28A0092B-C50C-407E-A947-70E740481C1C}">
+                <a14:useLocalDpi xmlns:a14="http://schemas.microsoft.com/office/drawing/2010/main" val="0"/>
+              </a:ext>
+            </a:extLst>
+          </a:blip>
+          <a:srcRect l="30833" t="24915" r="27500" b="25255"/>
+          <a:stretch/>
+        </p:blipFill>
+        <p:spPr>
+          <a:xfrm>
+            <a:off x="5067299" y="3809999"/>
+            <a:ext cx="1905005" cy="1524001"/>
+          </a:xfrm>
+          <a:prstGeom prst="rect">
+            <a:avLst/>
+          </a:prstGeom>
+        </p:spPr>
+      </p:pic>
+      <p:sp>
+        <p:nvSpPr>
+          <p:cNvPr id="7" name="selectMe2"/>
+          <p:cNvSpPr/>
+          <p:nvPr/>
+        </p:nvSpPr>
+        <p:spPr>
+          <a:xfrm>
+            <a:off x="1143000" y="1371600"/>
+            <a:ext cx="1905000" cy="1524000"/>
+          </a:xfrm>
+          <a:prstGeom prst="rect">
+            <a:avLst/>
+          </a:prstGeom>
+        </p:spPr>
+        <p:style>
+          <a:lnRef idx="2">
+            <a:schemeClr val="accent1">
+              <a:shade val="50000"/>
+            </a:schemeClr>
+          </a:lnRef>
+          <a:fillRef idx="1">
+            <a:schemeClr val="accent1"/>
+          </a:fillRef>
+          <a:effectRef idx="0">
+            <a:schemeClr val="accent1"/>
+          </a:effectRef>
+          <a:fontRef idx="minor">
+            <a:schemeClr val="lt1"/>
+          </a:fontRef>
+        </p:style>
+        <p:txBody>
+          <a:bodyPr rtlCol="0" anchor="ctr"/>
+          <a:lstStyle/>
+          <a:p>
+            <a:pPr algn="ctr"/>
+            <a:endParaRPr lang="en-US"/>
+          </a:p>
+        </p:txBody>
+      </p:sp>
+    </p:spTree>
+    <p:extLst>
+      <p:ext uri="{BB962C8B-B14F-4D97-AF65-F5344CB8AC3E}">
+        <p14:creationId xmlns:p14="http://schemas.microsoft.com/office/powerpoint/2010/main" val="26698444"/>
+      </p:ext>
+    </p:extLst>
+  </p:cSld>
+  <p:clrMapOvr>
+    <a:masterClrMapping/>
+  </p:clrMapOvr>
+</p:sld>
+</file>
+
+<file path=ppt/slides/slide35.xml><?xml version="1.0" encoding="utf-8"?>
 <p:sld xmlns:a="http://schemas.openxmlformats.org/drawingml/2006/main" xmlns:r="http://schemas.openxmlformats.org/officeDocument/2006/relationships" xmlns:p="http://schemas.openxmlformats.org/presentationml/2006/main" show="0">
   <p:cSld>
     <p:spTree>
@@ -12249,7 +12574,7 @@
           <a:p>
             <a:r>
               <a:rPr lang="en-US" dirty="0"/>
-              <a:t>Auto Crop:: Two edges cropped</a:t>
+              <a:t>Crop To Same:: Two edges cropped</a:t>
             </a:r>
             <a:endParaRPr lang="en-SG" dirty="0"/>
           </a:p>
@@ -12545,7 +12870,7 @@
           <a:p>
             <a:r>
               <a:rPr lang="en-US" dirty="0"/>
-              <a:t>Auto Crop:: Four edges cropped</a:t>
+              <a:t>Crop To Same:: Four edges cropped</a:t>
             </a:r>
             <a:endParaRPr lang="en-SG" dirty="0"/>
           </a:p>

</xml_diff>